<commit_message>
Se agrega tema ¿Qué es el codigo fuente? y se corrigen ortografias
</commit_message>
<xml_diff>
--- a/sotfwarelibre.pptx
+++ b/sotfwarelibre.pptx
@@ -16,6 +16,7 @@
     <p:sldId id="263" r:id="rId11"/>
     <p:sldId id="264" r:id="rId12"/>
     <p:sldId id="265" r:id="rId13"/>
+    <p:sldId id="266" r:id="rId14"/>
   </p:sldIdLst>
   <p:sldSz cx="10080625" cy="7559675"/>
   <p:notesSz cx="7559675" cy="10691812"/>
@@ -3329,7 +3330,7 @@
           <a:bodyPr lIns="0" rIns="0" tIns="0" bIns="0" anchor="ctr"/>
           <a:p>
             <a:pPr algn="ctr"/>
-            <a:fld id="{98282F74-07E9-44AA-BD07-79E20975D6BE}" type="slidenum">
+            <a:fld id="{D0EDC63E-A21B-4F59-ABEC-B2C9E6C4EEA2}" type="slidenum">
               <a:rPr b="1" lang="es-NI" sz="1800" spc="-1" strike="noStrike">
                 <a:solidFill>
                   <a:srgbClr val="ffffff"/>
@@ -3735,7 +3736,7 @@
           <a:bodyPr lIns="0" rIns="0" tIns="0" bIns="0"/>
           <a:p>
             <a:pPr algn="r"/>
-            <a:fld id="{18E54ECD-704C-4E04-BCC8-9B98528D7C17}" type="slidenum">
+            <a:fld id="{8E5DC137-4877-4373-9D22-6C33BCE21737}" type="slidenum">
               <a:rPr b="1" lang="es-NI" sz="1800" spc="-1" strike="noStrike">
                 <a:solidFill>
                   <a:srgbClr val="e74c3c"/>
@@ -3858,15 +3859,15 @@
               </a:buBlip>
             </a:pPr>
             <a:r>
-              <a:rPr b="0" lang="es-NI" sz="2200" spc="-1" strike="noStrike">
+              <a:rPr b="0" lang="es-NI" sz="2000" spc="-1" strike="noStrike">
                 <a:solidFill>
                   <a:srgbClr val="1c1c1c"/>
                 </a:solidFill>
                 <a:latin typeface="Source Sans Pro Light"/>
               </a:rPr>
-              <a:t>¿Que es el software?</a:t>
+              <a:t>¿Qué es el software?</a:t>
             </a:r>
-            <a:endParaRPr b="0" lang="es-NI" sz="2200" spc="-1" strike="noStrike">
+            <a:endParaRPr b="0" lang="es-NI" sz="2000" spc="-1" strike="noStrike">
               <a:solidFill>
                 <a:srgbClr val="1c1c1c"/>
               </a:solidFill>
@@ -3880,15 +3881,15 @@
               </a:buBlip>
             </a:pPr>
             <a:r>
-              <a:rPr b="0" lang="es-NI" sz="2200" spc="-1" strike="noStrike">
+              <a:rPr b="0" lang="es-NI" sz="2000" spc="-1" strike="noStrike">
                 <a:solidFill>
                   <a:srgbClr val="1c1c1c"/>
                 </a:solidFill>
                 <a:latin typeface="Source Sans Pro Light"/>
               </a:rPr>
-              <a:t>¿Que es Software Propietario?</a:t>
+              <a:t>¿Qué es código Fuente?</a:t>
             </a:r>
-            <a:endParaRPr b="0" lang="es-NI" sz="2200" spc="-1" strike="noStrike">
+            <a:endParaRPr b="0" lang="es-NI" sz="2000" spc="-1" strike="noStrike">
               <a:solidFill>
                 <a:srgbClr val="1c1c1c"/>
               </a:solidFill>
@@ -3902,15 +3903,15 @@
               </a:buBlip>
             </a:pPr>
             <a:r>
-              <a:rPr b="0" lang="es-NI" sz="2200" spc="-1" strike="noStrike">
+              <a:rPr b="0" lang="es-NI" sz="2000" spc="-1" strike="noStrike">
                 <a:solidFill>
                   <a:srgbClr val="1c1c1c"/>
                 </a:solidFill>
                 <a:latin typeface="Source Sans Pro Light"/>
               </a:rPr>
-              <a:t>¿Que es Software Libre?</a:t>
+              <a:t>¿Qué es Software Propietario?</a:t>
             </a:r>
-            <a:endParaRPr b="0" lang="es-NI" sz="2200" spc="-1" strike="noStrike">
+            <a:endParaRPr b="0" lang="es-NI" sz="2000" spc="-1" strike="noStrike">
               <a:solidFill>
                 <a:srgbClr val="1c1c1c"/>
               </a:solidFill>
@@ -3924,15 +3925,15 @@
               </a:buBlip>
             </a:pPr>
             <a:r>
-              <a:rPr b="0" lang="es-NI" sz="2200" spc="-1" strike="noStrike">
+              <a:rPr b="0" lang="es-NI" sz="2000" spc="-1" strike="noStrike">
                 <a:solidFill>
                   <a:srgbClr val="1c1c1c"/>
                 </a:solidFill>
                 <a:latin typeface="Source Sans Pro Light"/>
               </a:rPr>
-              <a:t>¿Por que usar software libre?</a:t>
+              <a:t>¿Qué es Software Libre?</a:t>
             </a:r>
-            <a:endParaRPr b="0" lang="es-NI" sz="2200" spc="-1" strike="noStrike">
+            <a:endParaRPr b="0" lang="es-NI" sz="2000" spc="-1" strike="noStrike">
               <a:solidFill>
                 <a:srgbClr val="1c1c1c"/>
               </a:solidFill>
@@ -3946,7 +3947,29 @@
               </a:buBlip>
             </a:pPr>
             <a:r>
-              <a:rPr b="0" lang="es-NI" sz="2200" spc="-1" strike="noStrike">
+              <a:rPr b="0" lang="es-NI" sz="2000" spc="-1" strike="noStrike">
+                <a:solidFill>
+                  <a:srgbClr val="1c1c1c"/>
+                </a:solidFill>
+                <a:latin typeface="Source Sans Pro Light"/>
+              </a:rPr>
+              <a:t>¿Por qué usar software libre?</a:t>
+            </a:r>
+            <a:endParaRPr b="0" lang="es-NI" sz="2000" spc="-1" strike="noStrike">
+              <a:solidFill>
+                <a:srgbClr val="1c1c1c"/>
+              </a:solidFill>
+              <a:latin typeface="Source Sans Pro Light"/>
+            </a:endParaRPr>
+          </a:p>
+          <a:p>
+            <a:pPr marL="216000" indent="-216000">
+              <a:buBlip>
+                <a:blip r:embed="rId6"/>
+              </a:buBlip>
+            </a:pPr>
+            <a:r>
+              <a:rPr b="0" lang="es-NI" sz="2000" spc="-1" strike="noStrike">
                 <a:solidFill>
                   <a:srgbClr val="1c1c1c"/>
                 </a:solidFill>
@@ -3954,29 +3977,7 @@
               </a:rPr>
               <a:t>Aceptación de usuarios.</a:t>
             </a:r>
-            <a:endParaRPr b="0" lang="es-NI" sz="2200" spc="-1" strike="noStrike">
-              <a:solidFill>
-                <a:srgbClr val="1c1c1c"/>
-              </a:solidFill>
-              <a:latin typeface="Source Sans Pro Light"/>
-            </a:endParaRPr>
-          </a:p>
-          <a:p>
-            <a:pPr marL="216000" indent="-216000">
-              <a:buBlip>
-                <a:blip r:embed="rId6"/>
-              </a:buBlip>
-            </a:pPr>
-            <a:r>
-              <a:rPr b="0" lang="es-NI" sz="2200" spc="-1" strike="noStrike">
-                <a:solidFill>
-                  <a:srgbClr val="1c1c1c"/>
-                </a:solidFill>
-                <a:latin typeface="Source Sans Pro Light"/>
-              </a:rPr>
-              <a:t>Distribuciones Gnu/Linux.</a:t>
-            </a:r>
-            <a:endParaRPr b="0" lang="es-NI" sz="2200" spc="-1" strike="noStrike">
+            <a:endParaRPr b="0" lang="es-NI" sz="2000" spc="-1" strike="noStrike">
               <a:solidFill>
                 <a:srgbClr val="1c1c1c"/>
               </a:solidFill>
@@ -3990,15 +3991,15 @@
               </a:buBlip>
             </a:pPr>
             <a:r>
-              <a:rPr b="0" lang="es-NI" sz="2200" spc="-1" strike="noStrike">
+              <a:rPr b="0" lang="es-NI" sz="2000" spc="-1" strike="noStrike">
                 <a:solidFill>
                   <a:srgbClr val="1c1c1c"/>
                 </a:solidFill>
                 <a:latin typeface="Source Sans Pro Light"/>
               </a:rPr>
-              <a:t>Mitos sobre Gnu/Linux</a:t>
+              <a:t>Distribuciones GNU/Linux.</a:t>
             </a:r>
-            <a:endParaRPr b="0" lang="es-NI" sz="2200" spc="-1" strike="noStrike">
+            <a:endParaRPr b="0" lang="es-NI" sz="2000" spc="-1" strike="noStrike">
               <a:solidFill>
                 <a:srgbClr val="1c1c1c"/>
               </a:solidFill>
@@ -4012,7 +4013,29 @@
               </a:buBlip>
             </a:pPr>
             <a:r>
-              <a:rPr b="0" lang="es-NI" sz="2200" spc="-1" strike="noStrike">
+              <a:rPr b="0" lang="es-NI" sz="2000" spc="-1" strike="noStrike">
+                <a:solidFill>
+                  <a:srgbClr val="1c1c1c"/>
+                </a:solidFill>
+                <a:latin typeface="Source Sans Pro Light"/>
+              </a:rPr>
+              <a:t>Mitos sobre GNU/Linux.</a:t>
+            </a:r>
+            <a:endParaRPr b="0" lang="es-NI" sz="2000" spc="-1" strike="noStrike">
+              <a:solidFill>
+                <a:srgbClr val="1c1c1c"/>
+              </a:solidFill>
+              <a:latin typeface="Source Sans Pro Light"/>
+            </a:endParaRPr>
+          </a:p>
+          <a:p>
+            <a:pPr marL="216000" indent="-216000">
+              <a:buBlip>
+                <a:blip r:embed="rId9"/>
+              </a:buBlip>
+            </a:pPr>
+            <a:r>
+              <a:rPr b="0" lang="es-NI" sz="2000" spc="-1" strike="noStrike">
                 <a:solidFill>
                   <a:srgbClr val="1c1c1c"/>
                 </a:solidFill>
@@ -4020,7 +4043,7 @@
               </a:rPr>
               <a:t>Software Libre alternativo.</a:t>
             </a:r>
-            <a:endParaRPr b="0" lang="es-NI" sz="2200" spc="-1" strike="noStrike">
+            <a:endParaRPr b="0" lang="es-NI" sz="2000" spc="-1" strike="noStrike">
               <a:solidFill>
                 <a:srgbClr val="1c1c1c"/>
               </a:solidFill>
@@ -4030,7 +4053,7 @@
           <a:p>
             <a:pPr marL="216000" indent="-216000"/>
             <a:r>
-              <a:rPr b="0" lang="es-NI" sz="2200" spc="-1" strike="noStrike">
+              <a:rPr b="0" lang="es-NI" sz="2000" spc="-1" strike="noStrike">
                 <a:solidFill>
                   <a:srgbClr val="1c1c1c"/>
                 </a:solidFill>
@@ -4038,7 +4061,7 @@
               </a:rPr>
               <a:t> </a:t>
             </a:r>
-            <a:endParaRPr b="0" lang="es-NI" sz="2200" spc="-1" strike="noStrike">
+            <a:endParaRPr b="0" lang="es-NI" sz="2000" spc="-1" strike="noStrike">
               <a:solidFill>
                 <a:srgbClr val="1c1c1c"/>
               </a:solidFill>
@@ -4054,7 +4077,7 @@
           <p:nvPr/>
         </p:nvPicPr>
         <p:blipFill>
-          <a:blip r:embed="rId9"/>
+          <a:blip r:embed="rId10"/>
           <a:stretch/>
         </p:blipFill>
         <p:spPr>
@@ -4077,7 +4100,7 @@
           <p:nvPr/>
         </p:nvPicPr>
         <p:blipFill>
-          <a:blip r:embed="rId10"/>
+          <a:blip r:embed="rId11"/>
           <a:stretch/>
         </p:blipFill>
         <p:spPr>
@@ -4144,7 +4167,431 @@
       </p:grpSpPr>
       <p:sp>
         <p:nvSpPr>
-          <p:cNvPr id="116" name="TextShape 1"/>
+          <p:cNvPr id="115" name="TextShape 1"/>
+          <p:cNvSpPr txBox="1"/>
+          <p:nvPr/>
+        </p:nvSpPr>
+        <p:spPr>
+          <a:xfrm>
+            <a:off x="360000" y="360000"/>
+            <a:ext cx="9360000" cy="900000"/>
+          </a:xfrm>
+          <a:prstGeom prst="rect">
+            <a:avLst/>
+          </a:prstGeom>
+          <a:noFill/>
+          <a:ln>
+            <a:noFill/>
+          </a:ln>
+        </p:spPr>
+        <p:txBody>
+          <a:bodyPr lIns="0" rIns="0" tIns="0" bIns="0" anchor="b"/>
+          <a:p>
+            <a:r>
+              <a:rPr b="1" lang="es-NI" sz="3200" spc="-1" strike="noStrike">
+                <a:solidFill>
+                  <a:srgbClr val="ffffff"/>
+                </a:solidFill>
+                <a:latin typeface="Source Sans Pro Black"/>
+              </a:rPr>
+              <a:t>Distribuciones Mas populares</a:t>
+            </a:r>
+            <a:endParaRPr b="1" lang="es-NI" sz="3200" spc="-1" strike="noStrike">
+              <a:solidFill>
+                <a:srgbClr val="ffffff"/>
+              </a:solidFill>
+              <a:latin typeface="Source Sans Pro Black"/>
+            </a:endParaRPr>
+          </a:p>
+        </p:txBody>
+      </p:sp>
+      <p:sp>
+        <p:nvSpPr>
+          <p:cNvPr id="116" name="TextShape 2"/>
+          <p:cNvSpPr txBox="1"/>
+          <p:nvPr/>
+        </p:nvSpPr>
+        <p:spPr>
+          <a:xfrm>
+            <a:off x="360000" y="1980000"/>
+            <a:ext cx="9180000" cy="4680000"/>
+          </a:xfrm>
+          <a:prstGeom prst="rect">
+            <a:avLst/>
+          </a:prstGeom>
+          <a:noFill/>
+          <a:ln>
+            <a:noFill/>
+          </a:ln>
+        </p:spPr>
+        <p:txBody>
+          <a:bodyPr lIns="0" rIns="0" tIns="0" bIns="0">
+            <a:normAutofit/>
+          </a:bodyPr>
+          <a:p>
+            <a:pPr>
+              <a:spcAft>
+                <a:spcPts val="1142"/>
+              </a:spcAft>
+            </a:pPr>
+            <a:r>
+              <a:rPr b="1" lang="es-NI" sz="2600" spc="-1" strike="noStrike">
+                <a:solidFill>
+                  <a:srgbClr val="1c1c1c"/>
+                </a:solidFill>
+                <a:latin typeface="Source Sans Pro Semibold"/>
+              </a:rPr>
+              <a:t>Mint </a:t>
+            </a:r>
+            <a:endParaRPr b="1" lang="es-NI" sz="2600" spc="-1" strike="noStrike">
+              <a:solidFill>
+                <a:srgbClr val="1c1c1c"/>
+              </a:solidFill>
+              <a:latin typeface="Source Sans Pro Semibold"/>
+            </a:endParaRPr>
+          </a:p>
+          <a:p>
+            <a:pPr>
+              <a:spcAft>
+                <a:spcPts val="1142"/>
+              </a:spcAft>
+            </a:pPr>
+            <a:r>
+              <a:rPr b="1" lang="es-NI" sz="2600" spc="-1" strike="noStrike">
+                <a:solidFill>
+                  <a:srgbClr val="1c1c1c"/>
+                </a:solidFill>
+                <a:latin typeface="Source Sans Pro Semibold"/>
+              </a:rPr>
+              <a:t>Debian </a:t>
+            </a:r>
+            <a:endParaRPr b="1" lang="es-NI" sz="2600" spc="-1" strike="noStrike">
+              <a:solidFill>
+                <a:srgbClr val="1c1c1c"/>
+              </a:solidFill>
+              <a:latin typeface="Source Sans Pro Semibold"/>
+            </a:endParaRPr>
+          </a:p>
+          <a:p>
+            <a:pPr>
+              <a:spcAft>
+                <a:spcPts val="1142"/>
+              </a:spcAft>
+            </a:pPr>
+            <a:r>
+              <a:rPr b="1" lang="es-NI" sz="2600" spc="-1" strike="noStrike">
+                <a:solidFill>
+                  <a:srgbClr val="1c1c1c"/>
+                </a:solidFill>
+                <a:latin typeface="Source Sans Pro Semibold"/>
+              </a:rPr>
+              <a:t>Ubuntu </a:t>
+            </a:r>
+            <a:endParaRPr b="1" lang="es-NI" sz="2600" spc="-1" strike="noStrike">
+              <a:solidFill>
+                <a:srgbClr val="1c1c1c"/>
+              </a:solidFill>
+              <a:latin typeface="Source Sans Pro Semibold"/>
+            </a:endParaRPr>
+          </a:p>
+          <a:p>
+            <a:pPr>
+              <a:spcAft>
+                <a:spcPts val="1142"/>
+              </a:spcAft>
+            </a:pPr>
+            <a:r>
+              <a:rPr b="1" lang="es-NI" sz="2600" spc="-1" strike="noStrike">
+                <a:solidFill>
+                  <a:srgbClr val="1c1c1c"/>
+                </a:solidFill>
+                <a:latin typeface="Source Sans Pro Semibold"/>
+              </a:rPr>
+              <a:t>openSUSE </a:t>
+            </a:r>
+            <a:endParaRPr b="1" lang="es-NI" sz="2600" spc="-1" strike="noStrike">
+              <a:solidFill>
+                <a:srgbClr val="1c1c1c"/>
+              </a:solidFill>
+              <a:latin typeface="Source Sans Pro Semibold"/>
+            </a:endParaRPr>
+          </a:p>
+          <a:p>
+            <a:pPr>
+              <a:spcAft>
+                <a:spcPts val="1142"/>
+              </a:spcAft>
+            </a:pPr>
+            <a:r>
+              <a:rPr b="1" lang="es-NI" sz="2600" spc="-1" strike="noStrike">
+                <a:solidFill>
+                  <a:srgbClr val="1c1c1c"/>
+                </a:solidFill>
+                <a:latin typeface="Source Sans Pro Semibold"/>
+              </a:rPr>
+              <a:t>Manjaro </a:t>
+            </a:r>
+            <a:endParaRPr b="1" lang="es-NI" sz="2600" spc="-1" strike="noStrike">
+              <a:solidFill>
+                <a:srgbClr val="1c1c1c"/>
+              </a:solidFill>
+              <a:latin typeface="Source Sans Pro Semibold"/>
+            </a:endParaRPr>
+          </a:p>
+          <a:p>
+            <a:pPr>
+              <a:spcAft>
+                <a:spcPts val="1142"/>
+              </a:spcAft>
+            </a:pPr>
+            <a:r>
+              <a:rPr b="1" lang="es-NI" sz="2600" spc="-1" strike="noStrike">
+                <a:solidFill>
+                  <a:srgbClr val="1c1c1c"/>
+                </a:solidFill>
+                <a:latin typeface="Source Sans Pro Semibold"/>
+              </a:rPr>
+              <a:t>Fedora </a:t>
+            </a:r>
+            <a:endParaRPr b="1" lang="es-NI" sz="2600" spc="-1" strike="noStrike">
+              <a:solidFill>
+                <a:srgbClr val="1c1c1c"/>
+              </a:solidFill>
+              <a:latin typeface="Source Sans Pro Semibold"/>
+            </a:endParaRPr>
+          </a:p>
+          <a:p>
+            <a:pPr>
+              <a:spcAft>
+                <a:spcPts val="1142"/>
+              </a:spcAft>
+            </a:pPr>
+            <a:r>
+              <a:rPr b="1" lang="es-NI" sz="2600" spc="-1" strike="noStrike">
+                <a:solidFill>
+                  <a:srgbClr val="1c1c1c"/>
+                </a:solidFill>
+                <a:latin typeface="Source Sans Pro Semibold"/>
+              </a:rPr>
+              <a:t>elementary </a:t>
+            </a:r>
+            <a:endParaRPr b="1" lang="es-NI" sz="2600" spc="-1" strike="noStrike">
+              <a:solidFill>
+                <a:srgbClr val="1c1c1c"/>
+              </a:solidFill>
+              <a:latin typeface="Source Sans Pro Semibold"/>
+            </a:endParaRPr>
+          </a:p>
+          <a:p>
+            <a:pPr>
+              <a:spcAft>
+                <a:spcPts val="1142"/>
+              </a:spcAft>
+            </a:pPr>
+            <a:r>
+              <a:rPr b="1" lang="es-NI" sz="2600" spc="-1" strike="noStrike">
+                <a:solidFill>
+                  <a:srgbClr val="1c1c1c"/>
+                </a:solidFill>
+                <a:latin typeface="Source Sans Pro Semibold"/>
+              </a:rPr>
+              <a:t>Zorin </a:t>
+            </a:r>
+            <a:endParaRPr b="1" lang="es-NI" sz="2600" spc="-1" strike="noStrike">
+              <a:solidFill>
+                <a:srgbClr val="1c1c1c"/>
+              </a:solidFill>
+              <a:latin typeface="Source Sans Pro Semibold"/>
+            </a:endParaRPr>
+          </a:p>
+          <a:p>
+            <a:pPr>
+              <a:spcAft>
+                <a:spcPts val="1142"/>
+              </a:spcAft>
+            </a:pPr>
+            <a:r>
+              <a:rPr b="1" lang="es-NI" sz="2600" spc="-1" strike="noStrike">
+                <a:solidFill>
+                  <a:srgbClr val="1c1c1c"/>
+                </a:solidFill>
+                <a:latin typeface="Source Sans Pro Semibold"/>
+              </a:rPr>
+              <a:t>CentOS </a:t>
+            </a:r>
+            <a:endParaRPr b="1" lang="es-NI" sz="2600" spc="-1" strike="noStrike">
+              <a:solidFill>
+                <a:srgbClr val="1c1c1c"/>
+              </a:solidFill>
+              <a:latin typeface="Source Sans Pro Semibold"/>
+            </a:endParaRPr>
+          </a:p>
+          <a:p>
+            <a:pPr>
+              <a:spcAft>
+                <a:spcPts val="1142"/>
+              </a:spcAft>
+            </a:pPr>
+            <a:r>
+              <a:rPr b="1" lang="es-NI" sz="2600" spc="-1" strike="noStrike">
+                <a:solidFill>
+                  <a:srgbClr val="1c1c1c"/>
+                </a:solidFill>
+                <a:latin typeface="Source Sans Pro Semibold"/>
+              </a:rPr>
+              <a:t>Arch </a:t>
+            </a:r>
+            <a:endParaRPr b="1" lang="es-NI" sz="2600" spc="-1" strike="noStrike">
+              <a:solidFill>
+                <a:srgbClr val="1c1c1c"/>
+              </a:solidFill>
+              <a:latin typeface="Source Sans Pro Semibold"/>
+            </a:endParaRPr>
+          </a:p>
+          <a:p>
+            <a:pPr>
+              <a:spcAft>
+                <a:spcPts val="1142"/>
+              </a:spcAft>
+            </a:pPr>
+            <a:r>
+              <a:rPr b="1" lang="es-NI" sz="2600" spc="-1" strike="noStrike">
+                <a:solidFill>
+                  <a:srgbClr val="1c1c1c"/>
+                </a:solidFill>
+                <a:latin typeface="Source Sans Pro Semibold"/>
+              </a:rPr>
+              <a:t> </a:t>
+            </a:r>
+            <a:endParaRPr b="1" lang="es-NI" sz="2600" spc="-1" strike="noStrike">
+              <a:solidFill>
+                <a:srgbClr val="1c1c1c"/>
+              </a:solidFill>
+              <a:latin typeface="Source Sans Pro Semibold"/>
+            </a:endParaRPr>
+          </a:p>
+          <a:p>
+            <a:pPr>
+              <a:spcAft>
+                <a:spcPts val="1142"/>
+              </a:spcAft>
+            </a:pPr>
+            <a:r>
+              <a:rPr b="1" lang="es-NI" sz="2600" spc="-1" strike="noStrike">
+                <a:solidFill>
+                  <a:srgbClr val="1c1c1c"/>
+                </a:solidFill>
+                <a:latin typeface="Source Sans Pro Semibold"/>
+              </a:rPr>
+              <a:t> </a:t>
+            </a:r>
+            <a:endParaRPr b="1" lang="es-NI" sz="2600" spc="-1" strike="noStrike">
+              <a:solidFill>
+                <a:srgbClr val="1c1c1c"/>
+              </a:solidFill>
+              <a:latin typeface="Source Sans Pro Semibold"/>
+            </a:endParaRPr>
+          </a:p>
+        </p:txBody>
+      </p:sp>
+      <p:pic>
+        <p:nvPicPr>
+          <p:cNvPr id="117" name="" descr=""/>
+          <p:cNvPicPr/>
+          <p:nvPr/>
+        </p:nvPicPr>
+        <p:blipFill>
+          <a:blip r:embed="rId1"/>
+          <a:stretch/>
+        </p:blipFill>
+        <p:spPr>
+          <a:xfrm>
+            <a:off x="3174840" y="1639080"/>
+            <a:ext cx="6287760" cy="4715640"/>
+          </a:xfrm>
+          <a:prstGeom prst="rect">
+            <a:avLst/>
+          </a:prstGeom>
+          <a:ln>
+            <a:noFill/>
+          </a:ln>
+        </p:spPr>
+      </p:pic>
+      <p:pic>
+        <p:nvPicPr>
+          <p:cNvPr id="118" name="" descr=""/>
+          <p:cNvPicPr/>
+          <p:nvPr/>
+        </p:nvPicPr>
+        <p:blipFill>
+          <a:blip r:embed="rId2"/>
+          <a:stretch/>
+        </p:blipFill>
+        <p:spPr>
+          <a:xfrm>
+            <a:off x="8816760" y="286920"/>
+            <a:ext cx="817200" cy="951480"/>
+          </a:xfrm>
+          <a:prstGeom prst="rect">
+            <a:avLst/>
+          </a:prstGeom>
+          <a:ln>
+            <a:noFill/>
+          </a:ln>
+        </p:spPr>
+      </p:pic>
+    </p:spTree>
+  </p:cSld>
+  <p:timing>
+    <p:tnLst>
+      <p:par>
+        <p:cTn id="19" dur="indefinite" restart="never" nodeType="tmRoot">
+          <p:childTnLst>
+            <p:seq>
+              <p:cTn id="20" nodeType="mainSeq"/>
+              <p:prevCondLst>
+                <p:cond delay="0" evt="onPrev">
+                  <p:tgtEl>
+                    <p:sldTgt/>
+                  </p:tgtEl>
+                </p:cond>
+              </p:prevCondLst>
+              <p:nextCondLst>
+                <p:cond delay="0" evt="onNext">
+                  <p:tgtEl>
+                    <p:sldTgt/>
+                  </p:tgtEl>
+                </p:cond>
+              </p:nextCondLst>
+            </p:seq>
+          </p:childTnLst>
+        </p:cTn>
+      </p:par>
+    </p:tnLst>
+  </p:timing>
+</p:sld>
+</file>
+
+<file path=ppt/slides/slide11.xml><?xml version="1.0" encoding="utf-8"?>
+<p:sld xmlns:a="http://schemas.openxmlformats.org/drawingml/2006/main" xmlns:p="http://schemas.openxmlformats.org/presentationml/2006/main" xmlns:r="http://schemas.openxmlformats.org/officeDocument/2006/relationships" xmlns:p14="http://schemas.microsoft.com/office/powerpoint/2010/main" xmlns:p15="http://schemas.microsoft.com/office/powerpoint/2012/main" xmlns:mc="http://schemas.openxmlformats.org/markup-compatibility/2006">
+  <p:cSld>
+    <p:spTree>
+      <p:nvGrpSpPr>
+        <p:cNvPr id="1" name=""/>
+        <p:cNvGrpSpPr/>
+        <p:nvPr/>
+      </p:nvGrpSpPr>
+      <p:grpSpPr>
+        <a:xfrm>
+          <a:off x="0" y="0"/>
+          <a:ext cx="0" cy="0"/>
+          <a:chOff x="0" y="0"/>
+          <a:chExt cx="0" cy="0"/>
+        </a:xfrm>
+      </p:grpSpPr>
+      <p:sp>
+        <p:nvSpPr>
+          <p:cNvPr id="119" name="TextShape 1"/>
           <p:cNvSpPr txBox="1"/>
           <p:nvPr/>
         </p:nvSpPr>
@@ -4184,13 +4631,13 @@
       </p:sp>
       <p:graphicFrame>
         <p:nvGraphicFramePr>
-          <p:cNvPr id="117" name="Table 2"/>
+          <p:cNvPr id="120" name="Table 2"/>
           <p:cNvGraphicFramePr/>
           <p:nvPr/>
         </p:nvGraphicFramePr>
         <p:xfrm>
           <a:off x="360000" y="1980000"/>
-          <a:ext cx="9179640" cy="4193640"/>
+          <a:ext cx="9179640" cy="4193280"/>
         </p:xfrm>
         <a:graphic>
           <a:graphicData uri="http://schemas.openxmlformats.org/drawingml/2006/table">
@@ -5961,10 +6408,10 @@
   <p:timing>
     <p:tnLst>
       <p:par>
-        <p:cTn id="19" dur="indefinite" restart="never" nodeType="tmRoot">
+        <p:cTn id="21" dur="indefinite" restart="never" nodeType="tmRoot">
           <p:childTnLst>
             <p:seq>
-              <p:cTn id="20" nodeType="mainSeq"/>
+              <p:cTn id="22" nodeType="mainSeq"/>
               <p:prevCondLst>
                 <p:cond delay="0" evt="onPrev">
                   <p:tgtEl>
@@ -6034,7 +6481,7 @@
                 </a:solidFill>
                 <a:latin typeface="Source Sans Pro Black"/>
               </a:rPr>
-              <a:t>¿Que es el software?</a:t>
+              <a:t>¿Qué es el software?</a:t>
             </a:r>
             <a:endParaRPr b="1" lang="es-NI" sz="3200" spc="-1" strike="noStrike">
               <a:solidFill>
@@ -6103,29 +6550,7 @@
                 </a:solidFill>
                 <a:latin typeface="Source Sans Pro Semibold"/>
               </a:rPr>
-              <a:t> </a:t>
-            </a:r>
-            <a:endParaRPr b="1" lang="es-NI" sz="2600" spc="-1" strike="noStrike">
-              <a:solidFill>
-                <a:srgbClr val="1c1c1c"/>
-              </a:solidFill>
-              <a:latin typeface="Source Sans Pro Semibold"/>
-            </a:endParaRPr>
-          </a:p>
-          <a:p>
-            <a:pPr>
-              <a:spcAft>
-                <a:spcPts val="1142"/>
-              </a:spcAft>
-            </a:pPr>
-            <a:r>
-              <a:rPr b="1" lang="es-NI" sz="2600" spc="-1" strike="noStrike">
-                <a:solidFill>
-                  <a:srgbClr val="1c1c1c"/>
-                </a:solidFill>
-                <a:latin typeface="Source Sans Pro Semibold"/>
-              </a:rPr>
-              <a:t>En pocas palabras, son aplicaciones o programas que funcionan solo en una computadora.</a:t>
+              <a:t>En pocas palabras, son aplicaciones o programas que funcionan solo en equipos informáticos (Computadores, Celulares, Tablet, etc).</a:t>
             </a:r>
             <a:endParaRPr b="1" lang="es-NI" sz="2600" spc="-1" strike="noStrike">
               <a:solidFill>
@@ -6237,7 +6662,7 @@
                 </a:solidFill>
                 <a:latin typeface="Source Sans Pro Black"/>
               </a:rPr>
-              <a:t>¿Que es Software Propietario?</a:t>
+              <a:t>¿Qué es código fuente?</a:t>
             </a:r>
             <a:endParaRPr b="1" lang="es-NI" sz="3200" spc="-1" strike="noStrike">
               <a:solidFill>
@@ -6284,7 +6709,7 @@
                 </a:solidFill>
                 <a:latin typeface="Source Sans Pro Semibold"/>
               </a:rPr>
-              <a:t>Se denomina con el falso amigo software propietario,​ o, dicho correctamente, privativo, al software del cual no existe una forma libre de acceso a su código fuente, el cual solo se encuentra a disposición de su desarrollador y no se permite su libre modificación, adaptación o incluso lectura por parte de terceros.</a:t>
+              <a:t>¿Qué es un código?</a:t>
             </a:r>
             <a:endParaRPr b="1" lang="es-NI" sz="2600" spc="-1" strike="noStrike">
               <a:solidFill>
@@ -6306,7 +6731,161 @@
                 </a:solidFill>
                 <a:latin typeface="Source Sans Pro Semibold"/>
               </a:rPr>
-              <a:t>Para la Fundación para el Software Libre (FSF), este concepto se aplica a cualquier programa informático que no es libre o que solo lo es parcialmente (semilibre), sea porque su uso, redistribución o modificación está prohibida, o sea porque requiere permiso expreso del titular del software.</a:t>
+              <a:t>El código es el lenguaje con que se comunica el emisor y el receptor,  una serie de símbolos que por separado puede no representan nada, pero al combinarlos pueden generar un lenguaje comprensible solo para aquellos quienes lo entiendan. </a:t>
+            </a:r>
+            <a:endParaRPr b="1" lang="es-NI" sz="2600" spc="-1" strike="noStrike">
+              <a:solidFill>
+                <a:srgbClr val="1c1c1c"/>
+              </a:solidFill>
+              <a:latin typeface="Source Sans Pro Semibold"/>
+            </a:endParaRPr>
+          </a:p>
+          <a:p>
+            <a:pPr>
+              <a:spcAft>
+                <a:spcPts val="1142"/>
+              </a:spcAft>
+            </a:pPr>
+            <a:r>
+              <a:rPr b="1" lang="es-NI" sz="2600" spc="-1" strike="noStrike">
+                <a:solidFill>
+                  <a:srgbClr val="1c1c1c"/>
+                </a:solidFill>
+                <a:latin typeface="Source Sans Pro Semibold"/>
+              </a:rPr>
+              <a:t>Ejemplo: una letra es un símbolo, un conjunto de letras hace  una palabra. La palabra Hola es un código que se utiliza para saludar.</a:t>
+            </a:r>
+            <a:endParaRPr b="1" lang="es-NI" sz="2600" spc="-1" strike="noStrike">
+              <a:solidFill>
+                <a:srgbClr val="1c1c1c"/>
+              </a:solidFill>
+              <a:latin typeface="Source Sans Pro Semibold"/>
+            </a:endParaRPr>
+          </a:p>
+          <a:p>
+            <a:pPr>
+              <a:spcAft>
+                <a:spcPts val="1142"/>
+              </a:spcAft>
+            </a:pPr>
+            <a:r>
+              <a:rPr b="1" lang="es-NI" sz="2600" spc="-1" strike="noStrike">
+                <a:solidFill>
+                  <a:srgbClr val="1c1c1c"/>
+                </a:solidFill>
+                <a:latin typeface="Source Sans Pro Semibold"/>
+              </a:rPr>
+              <a:t> </a:t>
+            </a:r>
+            <a:endParaRPr b="1" lang="es-NI" sz="2600" spc="-1" strike="noStrike">
+              <a:solidFill>
+                <a:srgbClr val="1c1c1c"/>
+              </a:solidFill>
+              <a:latin typeface="Source Sans Pro Semibold"/>
+            </a:endParaRPr>
+          </a:p>
+          <a:p>
+            <a:pPr>
+              <a:spcAft>
+                <a:spcPts val="1142"/>
+              </a:spcAft>
+            </a:pPr>
+            <a:r>
+              <a:rPr b="1" lang="es-NI" sz="2600" spc="-1" strike="noStrike">
+                <a:solidFill>
+                  <a:srgbClr val="1c1c1c"/>
+                </a:solidFill>
+                <a:latin typeface="Source Sans Pro Semibold"/>
+              </a:rPr>
+              <a:t>¿Entonces que es el código fuente?</a:t>
+            </a:r>
+            <a:endParaRPr b="1" lang="es-NI" sz="2600" spc="-1" strike="noStrike">
+              <a:solidFill>
+                <a:srgbClr val="1c1c1c"/>
+              </a:solidFill>
+              <a:latin typeface="Source Sans Pro Semibold"/>
+            </a:endParaRPr>
+          </a:p>
+          <a:p>
+            <a:pPr>
+              <a:spcAft>
+                <a:spcPts val="1142"/>
+              </a:spcAft>
+            </a:pPr>
+            <a:r>
+              <a:rPr b="1" lang="es-NI" sz="2600" spc="-1" strike="noStrike">
+                <a:solidFill>
+                  <a:srgbClr val="1c1c1c"/>
+                </a:solidFill>
+                <a:latin typeface="Source Sans Pro Semibold"/>
+              </a:rPr>
+              <a:t>Es un conjunto de símbolos agrupados con los pasos que debe seguir los equipos informáticos para ejecutar tareas especificas, comprensible para desarrolladores de software.</a:t>
+            </a:r>
+            <a:endParaRPr b="1" lang="es-NI" sz="2600" spc="-1" strike="noStrike">
+              <a:solidFill>
+                <a:srgbClr val="1c1c1c"/>
+              </a:solidFill>
+              <a:latin typeface="Source Sans Pro Semibold"/>
+            </a:endParaRPr>
+          </a:p>
+          <a:p>
+            <a:pPr>
+              <a:spcAft>
+                <a:spcPts val="1142"/>
+              </a:spcAft>
+            </a:pPr>
+            <a:r>
+              <a:rPr b="1" lang="es-NI" sz="2600" spc="-1" strike="noStrike">
+                <a:solidFill>
+                  <a:srgbClr val="1c1c1c"/>
+                </a:solidFill>
+                <a:latin typeface="Source Sans Pro Semibold"/>
+              </a:rPr>
+              <a:t>Ejemplo código fuente en lenguaje Python:</a:t>
+            </a:r>
+            <a:endParaRPr b="1" lang="es-NI" sz="2600" spc="-1" strike="noStrike">
+              <a:solidFill>
+                <a:srgbClr val="1c1c1c"/>
+              </a:solidFill>
+              <a:latin typeface="Source Sans Pro Semibold"/>
+            </a:endParaRPr>
+          </a:p>
+          <a:p>
+            <a:pPr>
+              <a:spcAft>
+                <a:spcPts val="1142"/>
+              </a:spcAft>
+            </a:pPr>
+            <a:r>
+              <a:rPr b="0" i="1" lang="es-NI" sz="2600" spc="-1" strike="noStrike">
+                <a:solidFill>
+                  <a:srgbClr val="1c1c1c"/>
+                </a:solidFill>
+                <a:latin typeface="Source Sans Pro Semibold"/>
+              </a:rPr>
+              <a:t>print(“Hola Mundo”) </a:t>
+            </a:r>
+            <a:endParaRPr b="1" lang="es-NI" sz="2600" spc="-1" strike="noStrike">
+              <a:solidFill>
+                <a:srgbClr val="1c1c1c"/>
+              </a:solidFill>
+              <a:latin typeface="Source Sans Pro Semibold"/>
+            </a:endParaRPr>
+          </a:p>
+          <a:p>
+            <a:pPr>
+              <a:spcAft>
+                <a:spcPts val="1142"/>
+              </a:spcAft>
+            </a:pPr>
+            <a:r>
+              <a:rPr b="1" lang="es-NI" sz="2600" spc="-1" strike="noStrike">
+                <a:solidFill>
+                  <a:srgbClr val="1c1c1c"/>
+                </a:solidFill>
+                <a:latin typeface="Source Sans Pro Semibold"/>
+              </a:rPr>
+              <a:t>Este código le dice al equipo informático que escriba en pantalla Hola Mundo. </a:t>
             </a:r>
             <a:endParaRPr b="1" lang="es-NI" sz="2600" spc="-1" strike="noStrike">
               <a:solidFill>
@@ -6329,7 +6908,7 @@
         </p:blipFill>
         <p:spPr>
           <a:xfrm>
-            <a:off x="8816760" y="308880"/>
+            <a:off x="8816760" y="308520"/>
             <a:ext cx="817200" cy="951480"/>
           </a:xfrm>
           <a:prstGeom prst="rect">
@@ -6418,7 +6997,7 @@
                 </a:solidFill>
                 <a:latin typeface="Source Sans Pro Black"/>
               </a:rPr>
-              <a:t>¿Que es Software Libre?</a:t>
+              <a:t>¿Qué es Software Propietario?</a:t>
             </a:r>
             <a:endParaRPr b="1" lang="es-NI" sz="3200" spc="-1" strike="noStrike">
               <a:solidFill>
@@ -6437,8 +7016,8 @@
         </p:nvSpPr>
         <p:spPr>
           <a:xfrm>
-            <a:off x="394200" y="1523880"/>
-            <a:ext cx="9180000" cy="1619280"/>
+            <a:off x="360000" y="1980000"/>
+            <a:ext cx="9180000" cy="4680000"/>
           </a:xfrm>
           <a:prstGeom prst="rect">
             <a:avLst/>
@@ -6449,7 +7028,7 @@
           </a:ln>
         </p:spPr>
         <p:txBody>
-          <a:bodyPr lIns="0" rIns="0" tIns="0" bIns="0" anchor="ctr">
+          <a:bodyPr lIns="0" rIns="0" tIns="0" bIns="0">
             <a:normAutofit/>
           </a:bodyPr>
           <a:p>
@@ -6459,7 +7038,29 @@
               </a:spcAft>
             </a:pPr>
             <a:r>
-              <a:rPr b="1" lang="es-NI" sz="2600" spc="-1" strike="noStrike">
+              <a:rPr b="1" lang="es-NI" sz="2200" spc="-1" strike="noStrike">
+                <a:solidFill>
+                  <a:srgbClr val="1c1c1c"/>
+                </a:solidFill>
+                <a:latin typeface="Source Sans Pro Semibold"/>
+              </a:rPr>
+              <a:t>Se denomina con el falso amigo software propietario,​ o, dicho correctamente, privativo, al software del cual no existe una forma libre de acceso a su código fuente, el cual solo se encuentra a disposición de su desarrollador y no se permite su libre modificación, adaptación o incluso lectura por parte de terceros.</a:t>
+            </a:r>
+            <a:endParaRPr b="1" lang="es-NI" sz="2200" spc="-1" strike="noStrike">
+              <a:solidFill>
+                <a:srgbClr val="1c1c1c"/>
+              </a:solidFill>
+              <a:latin typeface="Source Sans Pro Semibold"/>
+            </a:endParaRPr>
+          </a:p>
+          <a:p>
+            <a:pPr>
+              <a:spcAft>
+                <a:spcPts val="1142"/>
+              </a:spcAft>
+            </a:pPr>
+            <a:r>
+              <a:rPr b="1" lang="es-NI" sz="2200" spc="-1" strike="noStrike">
                 <a:solidFill>
                   <a:srgbClr val="1c1c1c"/>
                 </a:solidFill>
@@ -6467,16 +7068,7 @@
               </a:rPr>
               <a:t> </a:t>
             </a:r>
-            <a:r>
-              <a:rPr b="1" lang="es-NI" sz="2600" spc="-1" strike="noStrike">
-                <a:solidFill>
-                  <a:srgbClr val="1c1c1c"/>
-                </a:solidFill>
-                <a:latin typeface="Source Sans Pro Semibold"/>
-              </a:rPr>
-              <a:t>El término software libre refiere el conjunto de software que por elección manifiesta de su autor, puede ser copiado, estudiado, modificado, utilizado libremente con cualquier fin y redistribuido con o sin cambios o mejoras</a:t>
-            </a:r>
-            <a:endParaRPr b="1" lang="es-NI" sz="2600" spc="-1" strike="noStrike">
+            <a:endParaRPr b="1" lang="es-NI" sz="2200" spc="-1" strike="noStrike">
               <a:solidFill>
                 <a:srgbClr val="1c1c1c"/>
               </a:solidFill>
@@ -6490,35 +7082,15 @@
               </a:spcAft>
             </a:pPr>
             <a:r>
-              <a:rPr b="1" lang="es-NI" sz="2600" spc="-1" strike="noStrike" u="sng">
-                <a:solidFill>
-                  <a:srgbClr val="1c1c1c"/>
-                </a:solidFill>
-                <a:uFillTx/>
-                <a:latin typeface="Source Sans Pro Semibold"/>
-              </a:rPr>
-              <a:t> </a:t>
-            </a:r>
-            <a:r>
-              <a:rPr b="1" lang="es-NI" sz="2600" spc="-1" strike="noStrike" u="sng">
-                <a:solidFill>
-                  <a:srgbClr val="1c1c1c"/>
-                </a:solidFill>
-                <a:uFillTx/>
-                <a:latin typeface="Source Sans Pro Semibold"/>
-              </a:rPr>
-              <a:t>Un programa es software libre si los usuarios tienen las cuatro libertades esenciales:</a:t>
-            </a:r>
-            <a:r>
-              <a:rPr b="1" lang="es-NI" sz="2600" spc="-1" strike="noStrike">
+              <a:rPr b="1" lang="es-NI" sz="2200" spc="-1" strike="noStrike">
                 <a:solidFill>
                   <a:srgbClr val="1c1c1c"/>
                 </a:solidFill>
                 <a:latin typeface="Source Sans Pro Semibold"/>
               </a:rPr>
-              <a:t> </a:t>
+              <a:t>Para la Fundación para el Software Libre (FSF), este concepto se aplica a cualquier programa informático que no es libre o que solo lo es parcialmente (semilibre), sea porque su uso, redistribución o modificación está prohibida, o sea porque requiere permiso expreso del titular del software.</a:t>
             </a:r>
-            <a:endParaRPr b="1" lang="es-NI" sz="2600" spc="-1" strike="noStrike">
+            <a:endParaRPr b="1" lang="es-NI" sz="2200" spc="-1" strike="noStrike">
               <a:solidFill>
                 <a:srgbClr val="1c1c1c"/>
               </a:solidFill>
@@ -6550,544 +7122,6 @@
           </a:ln>
         </p:spPr>
       </p:pic>
-      <p:graphicFrame>
-        <p:nvGraphicFramePr>
-          <p:cNvPr id="100" name="Table 3"/>
-          <p:cNvGraphicFramePr/>
-          <p:nvPr/>
-        </p:nvGraphicFramePr>
-        <p:xfrm>
-          <a:off x="333720" y="3070080"/>
-          <a:ext cx="9240480" cy="3297240"/>
-        </p:xfrm>
-        <a:graphic>
-          <a:graphicData uri="http://schemas.openxmlformats.org/drawingml/2006/table">
-            <a:tbl>
-              <a:tblPr/>
-              <a:tblGrid>
-                <a:gridCol w="1880280"/>
-                <a:gridCol w="7360560"/>
-              </a:tblGrid>
-              <a:tr h="359280">
-                <a:tc>
-                  <a:txBody>
-                    <a:bodyPr lIns="90000" rIns="90000" tIns="46800" bIns="46800"/>
-                    <a:p>
-                      <a:pPr algn="ctr"/>
-                      <a:r>
-                        <a:rPr b="1" lang="es-NI" sz="1800" spc="-1" strike="noStrike">
-                          <a:latin typeface="Source Sans Pro"/>
-                        </a:rPr>
-                        <a:t>LIBERTAD</a:t>
-                      </a:r>
-                      <a:endParaRPr b="0" lang="es-NI" sz="1800" spc="-1" strike="noStrike">
-                        <a:latin typeface="Source Sans Pro"/>
-                      </a:endParaRPr>
-                    </a:p>
-                  </a:txBody>
-                  <a:tcPr marL="90000" marR="90000">
-                    <a:lnL w="720">
-                      <a:solidFill>
-                        <a:srgbClr val="ffffff"/>
-                      </a:solidFill>
-                    </a:lnL>
-                    <a:lnR w="720">
-                      <a:solidFill>
-                        <a:srgbClr val="ffffff"/>
-                      </a:solidFill>
-                    </a:lnR>
-                    <a:lnT w="720">
-                      <a:solidFill>
-                        <a:srgbClr val="ffffff"/>
-                      </a:solidFill>
-                    </a:lnT>
-                    <a:lnB w="720">
-                      <a:solidFill>
-                        <a:srgbClr val="ffffff"/>
-                      </a:solidFill>
-                    </a:lnB>
-                    <a:solidFill>
-                      <a:srgbClr val="b3b3b3"/>
-                    </a:solidFill>
-                  </a:tcPr>
-                </a:tc>
-                <a:tc>
-                  <a:txBody>
-                    <a:bodyPr lIns="90000" rIns="90000" tIns="46800" bIns="46800"/>
-                    <a:p>
-                      <a:pPr algn="ctr"/>
-                      <a:r>
-                        <a:rPr b="1" lang="es-NI" sz="1800" spc="-1" strike="noStrike">
-                          <a:latin typeface="Arial"/>
-                        </a:rPr>
-                        <a:t>DESCRIPCION</a:t>
-                      </a:r>
-                      <a:endParaRPr b="0" lang="es-NI" sz="1800" spc="-1" strike="noStrike">
-                        <a:latin typeface="Arial"/>
-                      </a:endParaRPr>
-                    </a:p>
-                  </a:txBody>
-                  <a:tcPr marL="90000" marR="90000">
-                    <a:lnL w="720">
-                      <a:solidFill>
-                        <a:srgbClr val="ffffff"/>
-                      </a:solidFill>
-                    </a:lnL>
-                    <a:lnR w="720">
-                      <a:solidFill>
-                        <a:srgbClr val="ffffff"/>
-                      </a:solidFill>
-                    </a:lnR>
-                    <a:lnT w="720">
-                      <a:solidFill>
-                        <a:srgbClr val="ffffff"/>
-                      </a:solidFill>
-                    </a:lnT>
-                    <a:lnB w="720">
-                      <a:solidFill>
-                        <a:srgbClr val="ffffff"/>
-                      </a:solidFill>
-                    </a:lnB>
-                    <a:solidFill>
-                      <a:srgbClr val="b3b3b3"/>
-                    </a:solidFill>
-                  </a:tcPr>
-                </a:tc>
-              </a:tr>
-              <a:tr h="354240">
-                <a:tc>
-                  <a:txBody>
-                    <a:bodyPr lIns="90000" rIns="90000" tIns="46800" bIns="46800"/>
-                    <a:p>
-                      <a:pPr algn="ctr"/>
-                      <a:r>
-                        <a:rPr b="1" lang="es-NI" sz="1800" spc="-1" strike="noStrike">
-                          <a:latin typeface="Arial"/>
-                        </a:rPr>
-                        <a:t>0</a:t>
-                      </a:r>
-                      <a:endParaRPr b="0" lang="es-NI" sz="1800" spc="-1" strike="noStrike">
-                        <a:latin typeface="Arial"/>
-                      </a:endParaRPr>
-                    </a:p>
-                  </a:txBody>
-                  <a:tcPr marL="90000" marR="90000">
-                    <a:lnL w="720">
-                      <a:solidFill>
-                        <a:srgbClr val="ffffff"/>
-                      </a:solidFill>
-                    </a:lnL>
-                    <a:lnR w="720">
-                      <a:solidFill>
-                        <a:srgbClr val="ffffff"/>
-                      </a:solidFill>
-                    </a:lnR>
-                    <a:lnT w="720">
-                      <a:solidFill>
-                        <a:srgbClr val="ffffff"/>
-                      </a:solidFill>
-                    </a:lnT>
-                    <a:lnB w="720">
-                      <a:solidFill>
-                        <a:srgbClr val="ffffff"/>
-                      </a:solidFill>
-                    </a:lnB>
-                    <a:solidFill>
-                      <a:srgbClr val="cccccc"/>
-                    </a:solidFill>
-                  </a:tcPr>
-                </a:tc>
-                <a:tc>
-                  <a:txBody>
-                    <a:bodyPr lIns="90000" rIns="90000" tIns="46800" bIns="46800"/>
-                    <a:p>
-                      <a:r>
-                        <a:rPr b="0" lang="es-NI" sz="1800" spc="-1" strike="noStrike">
-                          <a:latin typeface="Arial"/>
-                        </a:rPr>
-                        <a:t>la libertad de usar el programa, con cualquier propósito (uso).</a:t>
-                      </a:r>
-                      <a:endParaRPr b="0" lang="es-NI" sz="1800" spc="-1" strike="noStrike">
-                        <a:latin typeface="Arial"/>
-                      </a:endParaRPr>
-                    </a:p>
-                  </a:txBody>
-                  <a:tcPr marL="90000" marR="90000">
-                    <a:lnL w="720">
-                      <a:solidFill>
-                        <a:srgbClr val="ffffff"/>
-                      </a:solidFill>
-                    </a:lnL>
-                    <a:lnR w="720">
-                      <a:solidFill>
-                        <a:srgbClr val="ffffff"/>
-                      </a:solidFill>
-                    </a:lnR>
-                    <a:lnT w="720">
-                      <a:solidFill>
-                        <a:srgbClr val="ffffff"/>
-                      </a:solidFill>
-                    </a:lnT>
-                    <a:lnB w="720">
-                      <a:solidFill>
-                        <a:srgbClr val="ffffff"/>
-                      </a:solidFill>
-                    </a:lnB>
-                    <a:solidFill>
-                      <a:srgbClr val="cccccc"/>
-                    </a:solidFill>
-                  </a:tcPr>
-                </a:tc>
-              </a:tr>
-              <a:tr h="615600">
-                <a:tc>
-                  <a:txBody>
-                    <a:bodyPr lIns="90000" rIns="90000" tIns="46800" bIns="46800"/>
-                    <a:p>
-                      <a:pPr algn="ctr"/>
-                      <a:r>
-                        <a:rPr b="1" lang="es-NI" sz="1800" spc="-1" strike="noStrike">
-                          <a:latin typeface="Arial"/>
-                        </a:rPr>
-                        <a:t>1</a:t>
-                      </a:r>
-                      <a:endParaRPr b="0" lang="es-NI" sz="1800" spc="-1" strike="noStrike">
-                        <a:latin typeface="Arial"/>
-                      </a:endParaRPr>
-                    </a:p>
-                  </a:txBody>
-                  <a:tcPr marL="90000" marR="90000">
-                    <a:lnL w="720">
-                      <a:solidFill>
-                        <a:srgbClr val="ffffff"/>
-                      </a:solidFill>
-                    </a:lnL>
-                    <a:lnR w="720">
-                      <a:solidFill>
-                        <a:srgbClr val="ffffff"/>
-                      </a:solidFill>
-                    </a:lnR>
-                    <a:lnT w="720">
-                      <a:solidFill>
-                        <a:srgbClr val="ffffff"/>
-                      </a:solidFill>
-                    </a:lnT>
-                    <a:lnB w="720">
-                      <a:solidFill>
-                        <a:srgbClr val="ffffff"/>
-                      </a:solidFill>
-                    </a:lnB>
-                    <a:solidFill>
-                      <a:srgbClr val="e6e6e6"/>
-                    </a:solidFill>
-                  </a:tcPr>
-                </a:tc>
-                <a:tc>
-                  <a:txBody>
-                    <a:bodyPr lIns="90000" rIns="90000" tIns="46800" bIns="46800"/>
-                    <a:p>
-                      <a:r>
-                        <a:rPr b="0" lang="es-NI" sz="1800" spc="-1" strike="noStrike">
-                          <a:latin typeface="Arial"/>
-                        </a:rPr>
-                        <a:t>la libertad de estudiar cómo funciona el programa y modificarlo, adaptándolo a las propias necesidades (estudio).</a:t>
-                      </a:r>
-                      <a:endParaRPr b="0" lang="es-NI" sz="1800" spc="-1" strike="noStrike">
-                        <a:latin typeface="Arial"/>
-                      </a:endParaRPr>
-                    </a:p>
-                  </a:txBody>
-                  <a:tcPr marL="90000" marR="90000">
-                    <a:lnL w="720">
-                      <a:solidFill>
-                        <a:srgbClr val="ffffff"/>
-                      </a:solidFill>
-                    </a:lnL>
-                    <a:lnR w="720">
-                      <a:solidFill>
-                        <a:srgbClr val="ffffff"/>
-                      </a:solidFill>
-                    </a:lnR>
-                    <a:lnT w="720">
-                      <a:solidFill>
-                        <a:srgbClr val="ffffff"/>
-                      </a:solidFill>
-                    </a:lnT>
-                    <a:lnB w="720">
-                      <a:solidFill>
-                        <a:srgbClr val="ffffff"/>
-                      </a:solidFill>
-                    </a:lnB>
-                    <a:solidFill>
-                      <a:srgbClr val="e6e6e6"/>
-                    </a:solidFill>
-                  </a:tcPr>
-                </a:tc>
-              </a:tr>
-              <a:tr h="615600">
-                <a:tc>
-                  <a:txBody>
-                    <a:bodyPr lIns="90000" rIns="90000" tIns="46800" bIns="46800"/>
-                    <a:p>
-                      <a:pPr algn="ctr"/>
-                      <a:r>
-                        <a:rPr b="1" lang="es-NI" sz="1800" spc="-1" strike="noStrike">
-                          <a:latin typeface="Arial"/>
-                        </a:rPr>
-                        <a:t>2</a:t>
-                      </a:r>
-                      <a:endParaRPr b="0" lang="es-NI" sz="1800" spc="-1" strike="noStrike">
-                        <a:latin typeface="Arial"/>
-                      </a:endParaRPr>
-                    </a:p>
-                  </a:txBody>
-                  <a:tcPr marL="90000" marR="90000">
-                    <a:lnL w="720">
-                      <a:solidFill>
-                        <a:srgbClr val="ffffff"/>
-                      </a:solidFill>
-                    </a:lnL>
-                    <a:lnR w="720">
-                      <a:solidFill>
-                        <a:srgbClr val="ffffff"/>
-                      </a:solidFill>
-                    </a:lnR>
-                    <a:lnT w="720">
-                      <a:solidFill>
-                        <a:srgbClr val="ffffff"/>
-                      </a:solidFill>
-                    </a:lnT>
-                    <a:lnB w="720">
-                      <a:solidFill>
-                        <a:srgbClr val="ffffff"/>
-                      </a:solidFill>
-                    </a:lnB>
-                    <a:solidFill>
-                      <a:srgbClr val="cccccc"/>
-                    </a:solidFill>
-                  </a:tcPr>
-                </a:tc>
-                <a:tc>
-                  <a:txBody>
-                    <a:bodyPr lIns="90000" rIns="90000" tIns="46800" bIns="46800"/>
-                    <a:p>
-                      <a:r>
-                        <a:rPr b="0" lang="es-NI" sz="1800" spc="-1" strike="noStrike">
-                          <a:latin typeface="Arial"/>
-                        </a:rPr>
-                        <a:t>la libertad de distribuir copias del programa, con lo cual se puede ayudar a otros usuarios (distribución).</a:t>
-                      </a:r>
-                      <a:endParaRPr b="0" lang="es-NI" sz="1800" spc="-1" strike="noStrike">
-                        <a:latin typeface="Arial"/>
-                      </a:endParaRPr>
-                    </a:p>
-                  </a:txBody>
-                  <a:tcPr marL="90000" marR="90000">
-                    <a:lnL w="720">
-                      <a:solidFill>
-                        <a:srgbClr val="ffffff"/>
-                      </a:solidFill>
-                    </a:lnL>
-                    <a:lnR w="720">
-                      <a:solidFill>
-                        <a:srgbClr val="ffffff"/>
-                      </a:solidFill>
-                    </a:lnR>
-                    <a:lnT w="720">
-                      <a:solidFill>
-                        <a:srgbClr val="ffffff"/>
-                      </a:solidFill>
-                    </a:lnT>
-                    <a:lnB w="720">
-                      <a:solidFill>
-                        <a:srgbClr val="ffffff"/>
-                      </a:solidFill>
-                    </a:lnB>
-                    <a:solidFill>
-                      <a:srgbClr val="cccccc"/>
-                    </a:solidFill>
-                  </a:tcPr>
-                </a:tc>
-              </a:tr>
-              <a:tr h="638640">
-                <a:tc>
-                  <a:txBody>
-                    <a:bodyPr lIns="90000" rIns="90000" tIns="46800" bIns="46800"/>
-                    <a:p>
-                      <a:pPr algn="ctr"/>
-                      <a:r>
-                        <a:rPr b="1" lang="es-NI" sz="1800" spc="-1" strike="noStrike">
-                          <a:latin typeface="Arial"/>
-                        </a:rPr>
-                        <a:t>3</a:t>
-                      </a:r>
-                      <a:endParaRPr b="0" lang="es-NI" sz="1800" spc="-1" strike="noStrike">
-                        <a:latin typeface="Arial"/>
-                      </a:endParaRPr>
-                    </a:p>
-                  </a:txBody>
-                  <a:tcPr marL="90000" marR="90000">
-                    <a:lnL w="720">
-                      <a:solidFill>
-                        <a:srgbClr val="ffffff"/>
-                      </a:solidFill>
-                    </a:lnL>
-                    <a:lnR w="720">
-                      <a:solidFill>
-                        <a:srgbClr val="ffffff"/>
-                      </a:solidFill>
-                    </a:lnR>
-                    <a:lnT w="720">
-                      <a:solidFill>
-                        <a:srgbClr val="ffffff"/>
-                      </a:solidFill>
-                    </a:lnT>
-                    <a:lnB w="720">
-                      <a:solidFill>
-                        <a:srgbClr val="ffffff"/>
-                      </a:solidFill>
-                    </a:lnB>
-                    <a:solidFill>
-                      <a:srgbClr val="e6e6e6"/>
-                    </a:solidFill>
-                  </a:tcPr>
-                </a:tc>
-                <a:tc>
-                  <a:txBody>
-                    <a:bodyPr lIns="90000" rIns="90000" tIns="46800" bIns="46800"/>
-                    <a:p>
-                      <a:r>
-                        <a:rPr b="0" lang="es-NI" sz="1800" spc="-1" strike="noStrike">
-                          <a:latin typeface="Arial"/>
-                        </a:rPr>
-                        <a:t>la libertad de mejorar el programa y hacer públicas esas mejoras a los demás, de modo que toda la comunidad se beneficie (mejora).</a:t>
-                      </a:r>
-                      <a:endParaRPr b="0" lang="es-NI" sz="1800" spc="-1" strike="noStrike">
-                        <a:latin typeface="Arial"/>
-                      </a:endParaRPr>
-                    </a:p>
-                    <a:p>
-                      <a:endParaRPr b="0" lang="es-NI" sz="1800" spc="-1" strike="noStrike">
-                        <a:latin typeface="Arial"/>
-                      </a:endParaRPr>
-                    </a:p>
-                  </a:txBody>
-                  <a:tcPr marL="90000" marR="90000">
-                    <a:lnL w="720">
-                      <a:solidFill>
-                        <a:srgbClr val="ffffff"/>
-                      </a:solidFill>
-                    </a:lnL>
-                    <a:lnR w="720">
-                      <a:solidFill>
-                        <a:srgbClr val="ffffff"/>
-                      </a:solidFill>
-                    </a:lnR>
-                    <a:lnT w="720">
-                      <a:solidFill>
-                        <a:srgbClr val="ffffff"/>
-                      </a:solidFill>
-                    </a:lnT>
-                    <a:lnB w="720">
-                      <a:solidFill>
-                        <a:srgbClr val="ffffff"/>
-                      </a:solidFill>
-                    </a:lnB>
-                    <a:solidFill>
-                      <a:srgbClr val="e6e6e6"/>
-                    </a:solidFill>
-                  </a:tcPr>
-                </a:tc>
-              </a:tr>
-              <a:tr h="614160">
-                <a:tc>
-                  <a:txBody>
-                    <a:bodyPr lIns="90000" rIns="90000" tIns="46800" bIns="46800"/>
-                    <a:p>
-                      <a:pPr algn="ctr"/>
-                      <a:r>
-                        <a:rPr b="1" lang="es-NI" sz="1800" spc="-1" strike="noStrike">
-                          <a:latin typeface="Arial"/>
-                        </a:rPr>
-                        <a:t>1 Y 3</a:t>
-                      </a:r>
-                      <a:endParaRPr b="0" lang="es-NI" sz="1800" spc="-1" strike="noStrike">
-                        <a:latin typeface="Arial"/>
-                      </a:endParaRPr>
-                    </a:p>
-                  </a:txBody>
-                  <a:tcPr marL="90000" marR="90000">
-                    <a:lnL w="720">
-                      <a:solidFill>
-                        <a:srgbClr val="ffffff"/>
-                      </a:solidFill>
-                    </a:lnL>
-                    <a:lnR w="720">
-                      <a:solidFill>
-                        <a:srgbClr val="ffffff"/>
-                      </a:solidFill>
-                    </a:lnR>
-                    <a:lnT w="720">
-                      <a:solidFill>
-                        <a:srgbClr val="ffffff"/>
-                      </a:solidFill>
-                    </a:lnT>
-                    <a:lnB w="720">
-                      <a:solidFill>
-                        <a:srgbClr val="ffffff"/>
-                      </a:solidFill>
-                    </a:lnB>
-                    <a:solidFill>
-                      <a:srgbClr val="cccccc"/>
-                    </a:solidFill>
-                  </a:tcPr>
-                </a:tc>
-                <a:tc>
-                  <a:txBody>
-                    <a:bodyPr lIns="90000" rIns="90000" tIns="46800" bIns="46800"/>
-                    <a:p>
-                      <a:r>
-                        <a:rPr b="0" lang="es-NI" sz="1800" spc="-1" strike="noStrike">
-                          <a:latin typeface="Arial"/>
-                        </a:rPr>
-                        <a:t>requieren acceso al código fuente porque estudiar y modificar software sin su código fuente es muy poco viable.</a:t>
-                      </a:r>
-                      <a:endParaRPr b="0" lang="es-NI" sz="1800" spc="-1" strike="noStrike">
-                        <a:latin typeface="Arial"/>
-                      </a:endParaRPr>
-                    </a:p>
-                  </a:txBody>
-                  <a:tcPr marL="90000" marR="90000">
-                    <a:lnL w="720">
-                      <a:solidFill>
-                        <a:srgbClr val="ffffff"/>
-                      </a:solidFill>
-                    </a:lnL>
-                    <a:lnR w="720">
-                      <a:solidFill>
-                        <a:srgbClr val="ffffff"/>
-                      </a:solidFill>
-                    </a:lnR>
-                    <a:lnT w="720">
-                      <a:solidFill>
-                        <a:srgbClr val="ffffff"/>
-                      </a:solidFill>
-                    </a:lnT>
-                    <a:lnB w="720">
-                      <a:solidFill>
-                        <a:srgbClr val="ffffff"/>
-                      </a:solidFill>
-                    </a:lnB>
-                    <a:solidFill>
-                      <a:srgbClr val="cccccc"/>
-                    </a:solidFill>
-                  </a:tcPr>
-                </a:tc>
-              </a:tr>
-            </a:tbl>
-          </a:graphicData>
-        </a:graphic>
-      </p:graphicFrame>
     </p:spTree>
   </p:cSld>
   <p:timing>
@@ -7139,7 +7173,7 @@
       </p:grpSpPr>
       <p:sp>
         <p:nvSpPr>
-          <p:cNvPr id="101" name="TextShape 1"/>
+          <p:cNvPr id="100" name="TextShape 1"/>
           <p:cNvSpPr txBox="1"/>
           <p:nvPr/>
         </p:nvSpPr>
@@ -7166,7 +7200,7 @@
                 </a:solidFill>
                 <a:latin typeface="Source Sans Pro Black"/>
               </a:rPr>
-              <a:t>¿Por que usar software libre?</a:t>
+              <a:t>¿Qué es Software Libre?</a:t>
             </a:r>
             <a:endParaRPr b="1" lang="es-NI" sz="3200" spc="-1" strike="noStrike">
               <a:solidFill>
@@ -7179,14 +7213,14 @@
       </p:sp>
       <p:sp>
         <p:nvSpPr>
-          <p:cNvPr id="102" name="TextShape 2"/>
+          <p:cNvPr id="101" name="TextShape 2"/>
           <p:cNvSpPr txBox="1"/>
           <p:nvPr/>
         </p:nvSpPr>
         <p:spPr>
           <a:xfrm>
-            <a:off x="360000" y="1980000"/>
-            <a:ext cx="9180000" cy="4680000"/>
+            <a:off x="394200" y="1523880"/>
+            <a:ext cx="9180000" cy="1619280"/>
           </a:xfrm>
           <a:prstGeom prst="rect">
             <a:avLst/>
@@ -7197,17 +7231,14 @@
           </a:ln>
         </p:spPr>
         <p:txBody>
-          <a:bodyPr lIns="0" rIns="0" tIns="0" bIns="0">
+          <a:bodyPr lIns="0" rIns="0" tIns="0" bIns="0" anchor="ctr">
             <a:normAutofit/>
           </a:bodyPr>
           <a:p>
-            <a:pPr marL="216000" indent="-216000">
+            <a:pPr>
               <a:spcAft>
                 <a:spcPts val="1142"/>
               </a:spcAft>
-              <a:buBlip>
-                <a:blip r:embed="rId1"/>
-              </a:buBlip>
             </a:pPr>
             <a:r>
               <a:rPr b="1" lang="es-NI" sz="2600" spc="-1" strike="noStrike">
@@ -7216,24 +7247,8 @@
                 </a:solidFill>
                 <a:latin typeface="Source Sans Pro Semibold"/>
               </a:rPr>
-              <a:t>Puede ser compartido con otro usuarios.</a:t>
+              <a:t> </a:t>
             </a:r>
-            <a:endParaRPr b="1" lang="es-NI" sz="2600" spc="-1" strike="noStrike">
-              <a:solidFill>
-                <a:srgbClr val="1c1c1c"/>
-              </a:solidFill>
-              <a:latin typeface="Source Sans Pro Semibold"/>
-            </a:endParaRPr>
-          </a:p>
-          <a:p>
-            <a:pPr marL="216000" indent="-216000">
-              <a:spcAft>
-                <a:spcPts val="1142"/>
-              </a:spcAft>
-              <a:buBlip>
-                <a:blip r:embed="rId2"/>
-              </a:buBlip>
-            </a:pPr>
             <a:r>
               <a:rPr b="1" lang="es-NI" sz="2600" spc="-1" strike="noStrike">
                 <a:solidFill>
@@ -7241,7 +7256,7 @@
                 </a:solidFill>
                 <a:latin typeface="Source Sans Pro Semibold"/>
               </a:rPr>
-              <a:t>El usuario no depende del creador del software.</a:t>
+              <a:t>El término software libre refiere el conjunto de software que por elección manifiesta de su autor, puede ser copiado, estudiado, modificado, utilizado libremente con cualquier fin y redistribuido con o sin cambios o mejoras</a:t>
             </a:r>
             <a:endParaRPr b="1" lang="es-NI" sz="2600" spc="-1" strike="noStrike">
               <a:solidFill>
@@ -7251,14 +7266,31 @@
             </a:endParaRPr>
           </a:p>
           <a:p>
-            <a:pPr marL="216000" indent="-216000">
+            <a:pPr>
               <a:spcAft>
                 <a:spcPts val="1142"/>
               </a:spcAft>
-              <a:buBlip>
-                <a:blip r:embed="rId3"/>
-              </a:buBlip>
             </a:pPr>
+            <a:r>
+              <a:rPr b="1" lang="es-NI" sz="2600" spc="-1" strike="noStrike" u="sng">
+                <a:solidFill>
+                  <a:srgbClr val="1c1c1c"/>
+                </a:solidFill>
+                <a:uFillTx/>
+                <a:latin typeface="Source Sans Pro Semibold"/>
+              </a:rPr>
+              <a:t> </a:t>
+            </a:r>
+            <a:r>
+              <a:rPr b="1" lang="es-NI" sz="2600" spc="-1" strike="noStrike" u="sng">
+                <a:solidFill>
+                  <a:srgbClr val="1c1c1c"/>
+                </a:solidFill>
+                <a:uFillTx/>
+                <a:latin typeface="Source Sans Pro Semibold"/>
+              </a:rPr>
+              <a:t>Un programa es software libre si los usuarios tienen las cuatro libertades esenciales:</a:t>
+            </a:r>
             <a:r>
               <a:rPr b="1" lang="es-NI" sz="2600" spc="-1" strike="noStrike">
                 <a:solidFill>
@@ -7266,7 +7298,7 @@
                 </a:solidFill>
                 <a:latin typeface="Source Sans Pro Semibold"/>
               </a:rPr>
-              <a:t>No infringe ninguna ley al utilizarlo o distribuirlo.</a:t>
+              <a:t> </a:t>
             </a:r>
             <a:endParaRPr b="1" lang="es-NI" sz="2600" spc="-1" strike="noStrike">
               <a:solidFill>
@@ -7275,121 +7307,21 @@
               <a:latin typeface="Source Sans Pro Semibold"/>
             </a:endParaRPr>
           </a:p>
-          <a:p>
-            <a:pPr marL="216000" indent="-216000">
-              <a:spcAft>
-                <a:spcPts val="1142"/>
-              </a:spcAft>
-              <a:buBlip>
-                <a:blip r:embed="rId4"/>
-              </a:buBlip>
-            </a:pPr>
-            <a:r>
-              <a:rPr b="1" lang="es-NI" sz="2600" spc="-1" strike="noStrike">
-                <a:solidFill>
-                  <a:srgbClr val="1c1c1c"/>
-                </a:solidFill>
-                <a:latin typeface="Source Sans Pro Semibold"/>
-              </a:rPr>
-              <a:t>Elijes los programa que Quieres usar sin condicionamiento del Desarrollador.</a:t>
-            </a:r>
-            <a:endParaRPr b="1" lang="es-NI" sz="2600" spc="-1" strike="noStrike">
-              <a:solidFill>
-                <a:srgbClr val="1c1c1c"/>
-              </a:solidFill>
-              <a:latin typeface="Source Sans Pro Semibold"/>
-            </a:endParaRPr>
-          </a:p>
-          <a:p>
-            <a:pPr marL="216000" indent="-216000">
-              <a:spcAft>
-                <a:spcPts val="1142"/>
-              </a:spcAft>
-              <a:buBlip>
-                <a:blip r:embed="rId5"/>
-              </a:buBlip>
-            </a:pPr>
-            <a:r>
-              <a:rPr b="1" lang="es-NI" sz="2600" spc="-1" strike="noStrike">
-                <a:solidFill>
-                  <a:srgbClr val="1c1c1c"/>
-                </a:solidFill>
-                <a:latin typeface="Source Sans Pro Semibold"/>
-              </a:rPr>
-              <a:t>No contiene código malicioso o que invada tu privacidad.</a:t>
-            </a:r>
-            <a:endParaRPr b="1" lang="es-NI" sz="2600" spc="-1" strike="noStrike">
-              <a:solidFill>
-                <a:srgbClr val="1c1c1c"/>
-              </a:solidFill>
-              <a:latin typeface="Source Sans Pro Semibold"/>
-            </a:endParaRPr>
-          </a:p>
-          <a:p>
-            <a:pPr marL="216000" indent="-216000">
-              <a:spcAft>
-                <a:spcPts val="1142"/>
-              </a:spcAft>
-              <a:buBlip>
-                <a:blip r:embed="rId6"/>
-              </a:buBlip>
-            </a:pPr>
-            <a:r>
-              <a:rPr b="1" lang="es-NI" sz="2600" spc="-1" strike="noStrike">
-                <a:solidFill>
-                  <a:srgbClr val="1c1c1c"/>
-                </a:solidFill>
-                <a:latin typeface="Source Sans Pro Semibold"/>
-              </a:rPr>
-              <a:t>Con los archivos fuentes de los programas puede aprender a programar.</a:t>
-            </a:r>
-            <a:endParaRPr b="1" lang="es-NI" sz="2600" spc="-1" strike="noStrike">
-              <a:solidFill>
-                <a:srgbClr val="1c1c1c"/>
-              </a:solidFill>
-              <a:latin typeface="Source Sans Pro Semibold"/>
-            </a:endParaRPr>
-          </a:p>
-          <a:p>
-            <a:pPr marL="216000" indent="-216000">
-              <a:spcAft>
-                <a:spcPts val="1142"/>
-              </a:spcAft>
-              <a:buBlip>
-                <a:blip r:embed="rId7"/>
-              </a:buBlip>
-            </a:pPr>
-            <a:r>
-              <a:rPr b="1" lang="es-NI" sz="2600" spc="-1" strike="noStrike">
-                <a:solidFill>
-                  <a:srgbClr val="1c1c1c"/>
-                </a:solidFill>
-                <a:latin typeface="Source Sans Pro Semibold"/>
-              </a:rPr>
-              <a:t>Sin números de aplicaciones para la educación, entretenimiento,Desarrollo,Ingeniera y ciencias.</a:t>
-            </a:r>
-            <a:endParaRPr b="1" lang="es-NI" sz="2600" spc="-1" strike="noStrike">
-              <a:solidFill>
-                <a:srgbClr val="1c1c1c"/>
-              </a:solidFill>
-              <a:latin typeface="Source Sans Pro Semibold"/>
-            </a:endParaRPr>
-          </a:p>
         </p:txBody>
       </p:sp>
       <p:pic>
         <p:nvPicPr>
-          <p:cNvPr id="103" name="" descr=""/>
+          <p:cNvPr id="102" name="" descr=""/>
           <p:cNvPicPr/>
           <p:nvPr/>
         </p:nvPicPr>
         <p:blipFill>
-          <a:blip r:embed="rId8"/>
+          <a:blip r:embed="rId1"/>
           <a:stretch/>
         </p:blipFill>
         <p:spPr>
           <a:xfrm>
-            <a:off x="8816760" y="309240"/>
+            <a:off x="8816760" y="308880"/>
             <a:ext cx="817200" cy="951480"/>
           </a:xfrm>
           <a:prstGeom prst="rect">
@@ -7400,6 +7332,544 @@
           </a:ln>
         </p:spPr>
       </p:pic>
+      <p:graphicFrame>
+        <p:nvGraphicFramePr>
+          <p:cNvPr id="103" name="Table 3"/>
+          <p:cNvGraphicFramePr/>
+          <p:nvPr/>
+        </p:nvGraphicFramePr>
+        <p:xfrm>
+          <a:off x="333720" y="3070080"/>
+          <a:ext cx="9240480" cy="3297240"/>
+        </p:xfrm>
+        <a:graphic>
+          <a:graphicData uri="http://schemas.openxmlformats.org/drawingml/2006/table">
+            <a:tbl>
+              <a:tblPr/>
+              <a:tblGrid>
+                <a:gridCol w="1880280"/>
+                <a:gridCol w="7360560"/>
+              </a:tblGrid>
+              <a:tr h="359280">
+                <a:tc>
+                  <a:txBody>
+                    <a:bodyPr lIns="90000" rIns="90000" tIns="46800" bIns="46800"/>
+                    <a:p>
+                      <a:pPr algn="ctr"/>
+                      <a:r>
+                        <a:rPr b="1" lang="es-NI" sz="1800" spc="-1" strike="noStrike">
+                          <a:latin typeface="Source Sans Pro"/>
+                        </a:rPr>
+                        <a:t>LIBERTAD</a:t>
+                      </a:r>
+                      <a:endParaRPr b="0" lang="es-NI" sz="1800" spc="-1" strike="noStrike">
+                        <a:latin typeface="Source Sans Pro"/>
+                      </a:endParaRPr>
+                    </a:p>
+                  </a:txBody>
+                  <a:tcPr marL="90000" marR="90000">
+                    <a:lnL w="720">
+                      <a:solidFill>
+                        <a:srgbClr val="ffffff"/>
+                      </a:solidFill>
+                    </a:lnL>
+                    <a:lnR w="720">
+                      <a:solidFill>
+                        <a:srgbClr val="ffffff"/>
+                      </a:solidFill>
+                    </a:lnR>
+                    <a:lnT w="720">
+                      <a:solidFill>
+                        <a:srgbClr val="ffffff"/>
+                      </a:solidFill>
+                    </a:lnT>
+                    <a:lnB w="720">
+                      <a:solidFill>
+                        <a:srgbClr val="ffffff"/>
+                      </a:solidFill>
+                    </a:lnB>
+                    <a:solidFill>
+                      <a:srgbClr val="b3b3b3"/>
+                    </a:solidFill>
+                  </a:tcPr>
+                </a:tc>
+                <a:tc>
+                  <a:txBody>
+                    <a:bodyPr lIns="90000" rIns="90000" tIns="46800" bIns="46800"/>
+                    <a:p>
+                      <a:pPr algn="ctr"/>
+                      <a:r>
+                        <a:rPr b="1" lang="es-NI" sz="1800" spc="-1" strike="noStrike">
+                          <a:latin typeface="Arial"/>
+                        </a:rPr>
+                        <a:t>DESCRIPCION</a:t>
+                      </a:r>
+                      <a:endParaRPr b="0" lang="es-NI" sz="1800" spc="-1" strike="noStrike">
+                        <a:latin typeface="Arial"/>
+                      </a:endParaRPr>
+                    </a:p>
+                  </a:txBody>
+                  <a:tcPr marL="90000" marR="90000">
+                    <a:lnL w="720">
+                      <a:solidFill>
+                        <a:srgbClr val="ffffff"/>
+                      </a:solidFill>
+                    </a:lnL>
+                    <a:lnR w="720">
+                      <a:solidFill>
+                        <a:srgbClr val="ffffff"/>
+                      </a:solidFill>
+                    </a:lnR>
+                    <a:lnT w="720">
+                      <a:solidFill>
+                        <a:srgbClr val="ffffff"/>
+                      </a:solidFill>
+                    </a:lnT>
+                    <a:lnB w="720">
+                      <a:solidFill>
+                        <a:srgbClr val="ffffff"/>
+                      </a:solidFill>
+                    </a:lnB>
+                    <a:solidFill>
+                      <a:srgbClr val="b3b3b3"/>
+                    </a:solidFill>
+                  </a:tcPr>
+                </a:tc>
+              </a:tr>
+              <a:tr h="354240">
+                <a:tc>
+                  <a:txBody>
+                    <a:bodyPr lIns="90000" rIns="90000" tIns="46800" bIns="46800"/>
+                    <a:p>
+                      <a:pPr algn="ctr"/>
+                      <a:r>
+                        <a:rPr b="1" lang="es-NI" sz="1800" spc="-1" strike="noStrike">
+                          <a:latin typeface="Arial"/>
+                        </a:rPr>
+                        <a:t>0</a:t>
+                      </a:r>
+                      <a:endParaRPr b="0" lang="es-NI" sz="1800" spc="-1" strike="noStrike">
+                        <a:latin typeface="Arial"/>
+                      </a:endParaRPr>
+                    </a:p>
+                  </a:txBody>
+                  <a:tcPr marL="90000" marR="90000">
+                    <a:lnL w="720">
+                      <a:solidFill>
+                        <a:srgbClr val="ffffff"/>
+                      </a:solidFill>
+                    </a:lnL>
+                    <a:lnR w="720">
+                      <a:solidFill>
+                        <a:srgbClr val="ffffff"/>
+                      </a:solidFill>
+                    </a:lnR>
+                    <a:lnT w="720">
+                      <a:solidFill>
+                        <a:srgbClr val="ffffff"/>
+                      </a:solidFill>
+                    </a:lnT>
+                    <a:lnB w="720">
+                      <a:solidFill>
+                        <a:srgbClr val="ffffff"/>
+                      </a:solidFill>
+                    </a:lnB>
+                    <a:solidFill>
+                      <a:srgbClr val="cccccc"/>
+                    </a:solidFill>
+                  </a:tcPr>
+                </a:tc>
+                <a:tc>
+                  <a:txBody>
+                    <a:bodyPr lIns="90000" rIns="90000" tIns="46800" bIns="46800"/>
+                    <a:p>
+                      <a:r>
+                        <a:rPr b="0" lang="es-NI" sz="1800" spc="-1" strike="noStrike">
+                          <a:latin typeface="Arial"/>
+                        </a:rPr>
+                        <a:t>la libertad de usar el programa, con cualquier propósito (uso).</a:t>
+                      </a:r>
+                      <a:endParaRPr b="0" lang="es-NI" sz="1800" spc="-1" strike="noStrike">
+                        <a:latin typeface="Arial"/>
+                      </a:endParaRPr>
+                    </a:p>
+                  </a:txBody>
+                  <a:tcPr marL="90000" marR="90000">
+                    <a:lnL w="720">
+                      <a:solidFill>
+                        <a:srgbClr val="ffffff"/>
+                      </a:solidFill>
+                    </a:lnL>
+                    <a:lnR w="720">
+                      <a:solidFill>
+                        <a:srgbClr val="ffffff"/>
+                      </a:solidFill>
+                    </a:lnR>
+                    <a:lnT w="720">
+                      <a:solidFill>
+                        <a:srgbClr val="ffffff"/>
+                      </a:solidFill>
+                    </a:lnT>
+                    <a:lnB w="720">
+                      <a:solidFill>
+                        <a:srgbClr val="ffffff"/>
+                      </a:solidFill>
+                    </a:lnB>
+                    <a:solidFill>
+                      <a:srgbClr val="cccccc"/>
+                    </a:solidFill>
+                  </a:tcPr>
+                </a:tc>
+              </a:tr>
+              <a:tr h="615600">
+                <a:tc>
+                  <a:txBody>
+                    <a:bodyPr lIns="90000" rIns="90000" tIns="46800" bIns="46800"/>
+                    <a:p>
+                      <a:pPr algn="ctr"/>
+                      <a:r>
+                        <a:rPr b="1" lang="es-NI" sz="1800" spc="-1" strike="noStrike">
+                          <a:latin typeface="Arial"/>
+                        </a:rPr>
+                        <a:t>1</a:t>
+                      </a:r>
+                      <a:endParaRPr b="0" lang="es-NI" sz="1800" spc="-1" strike="noStrike">
+                        <a:latin typeface="Arial"/>
+                      </a:endParaRPr>
+                    </a:p>
+                  </a:txBody>
+                  <a:tcPr marL="90000" marR="90000">
+                    <a:lnL w="720">
+                      <a:solidFill>
+                        <a:srgbClr val="ffffff"/>
+                      </a:solidFill>
+                    </a:lnL>
+                    <a:lnR w="720">
+                      <a:solidFill>
+                        <a:srgbClr val="ffffff"/>
+                      </a:solidFill>
+                    </a:lnR>
+                    <a:lnT w="720">
+                      <a:solidFill>
+                        <a:srgbClr val="ffffff"/>
+                      </a:solidFill>
+                    </a:lnT>
+                    <a:lnB w="720">
+                      <a:solidFill>
+                        <a:srgbClr val="ffffff"/>
+                      </a:solidFill>
+                    </a:lnB>
+                    <a:solidFill>
+                      <a:srgbClr val="e6e6e6"/>
+                    </a:solidFill>
+                  </a:tcPr>
+                </a:tc>
+                <a:tc>
+                  <a:txBody>
+                    <a:bodyPr lIns="90000" rIns="90000" tIns="46800" bIns="46800"/>
+                    <a:p>
+                      <a:r>
+                        <a:rPr b="0" lang="es-NI" sz="1800" spc="-1" strike="noStrike">
+                          <a:latin typeface="Arial"/>
+                        </a:rPr>
+                        <a:t>la libertad de estudiar cómo funciona el programa y modificarlo, adaptándolo a las propias necesidades (estudio).</a:t>
+                      </a:r>
+                      <a:endParaRPr b="0" lang="es-NI" sz="1800" spc="-1" strike="noStrike">
+                        <a:latin typeface="Arial"/>
+                      </a:endParaRPr>
+                    </a:p>
+                  </a:txBody>
+                  <a:tcPr marL="90000" marR="90000">
+                    <a:lnL w="720">
+                      <a:solidFill>
+                        <a:srgbClr val="ffffff"/>
+                      </a:solidFill>
+                    </a:lnL>
+                    <a:lnR w="720">
+                      <a:solidFill>
+                        <a:srgbClr val="ffffff"/>
+                      </a:solidFill>
+                    </a:lnR>
+                    <a:lnT w="720">
+                      <a:solidFill>
+                        <a:srgbClr val="ffffff"/>
+                      </a:solidFill>
+                    </a:lnT>
+                    <a:lnB w="720">
+                      <a:solidFill>
+                        <a:srgbClr val="ffffff"/>
+                      </a:solidFill>
+                    </a:lnB>
+                    <a:solidFill>
+                      <a:srgbClr val="e6e6e6"/>
+                    </a:solidFill>
+                  </a:tcPr>
+                </a:tc>
+              </a:tr>
+              <a:tr h="615600">
+                <a:tc>
+                  <a:txBody>
+                    <a:bodyPr lIns="90000" rIns="90000" tIns="46800" bIns="46800"/>
+                    <a:p>
+                      <a:pPr algn="ctr"/>
+                      <a:r>
+                        <a:rPr b="1" lang="es-NI" sz="1800" spc="-1" strike="noStrike">
+                          <a:latin typeface="Arial"/>
+                        </a:rPr>
+                        <a:t>2</a:t>
+                      </a:r>
+                      <a:endParaRPr b="0" lang="es-NI" sz="1800" spc="-1" strike="noStrike">
+                        <a:latin typeface="Arial"/>
+                      </a:endParaRPr>
+                    </a:p>
+                  </a:txBody>
+                  <a:tcPr marL="90000" marR="90000">
+                    <a:lnL w="720">
+                      <a:solidFill>
+                        <a:srgbClr val="ffffff"/>
+                      </a:solidFill>
+                    </a:lnL>
+                    <a:lnR w="720">
+                      <a:solidFill>
+                        <a:srgbClr val="ffffff"/>
+                      </a:solidFill>
+                    </a:lnR>
+                    <a:lnT w="720">
+                      <a:solidFill>
+                        <a:srgbClr val="ffffff"/>
+                      </a:solidFill>
+                    </a:lnT>
+                    <a:lnB w="720">
+                      <a:solidFill>
+                        <a:srgbClr val="ffffff"/>
+                      </a:solidFill>
+                    </a:lnB>
+                    <a:solidFill>
+                      <a:srgbClr val="cccccc"/>
+                    </a:solidFill>
+                  </a:tcPr>
+                </a:tc>
+                <a:tc>
+                  <a:txBody>
+                    <a:bodyPr lIns="90000" rIns="90000" tIns="46800" bIns="46800"/>
+                    <a:p>
+                      <a:r>
+                        <a:rPr b="0" lang="es-NI" sz="1800" spc="-1" strike="noStrike">
+                          <a:latin typeface="Arial"/>
+                        </a:rPr>
+                        <a:t>la libertad de distribuir copias del programa, con lo cual se puede ayudar a otros usuarios (distribución).</a:t>
+                      </a:r>
+                      <a:endParaRPr b="0" lang="es-NI" sz="1800" spc="-1" strike="noStrike">
+                        <a:latin typeface="Arial"/>
+                      </a:endParaRPr>
+                    </a:p>
+                  </a:txBody>
+                  <a:tcPr marL="90000" marR="90000">
+                    <a:lnL w="720">
+                      <a:solidFill>
+                        <a:srgbClr val="ffffff"/>
+                      </a:solidFill>
+                    </a:lnL>
+                    <a:lnR w="720">
+                      <a:solidFill>
+                        <a:srgbClr val="ffffff"/>
+                      </a:solidFill>
+                    </a:lnR>
+                    <a:lnT w="720">
+                      <a:solidFill>
+                        <a:srgbClr val="ffffff"/>
+                      </a:solidFill>
+                    </a:lnT>
+                    <a:lnB w="720">
+                      <a:solidFill>
+                        <a:srgbClr val="ffffff"/>
+                      </a:solidFill>
+                    </a:lnB>
+                    <a:solidFill>
+                      <a:srgbClr val="cccccc"/>
+                    </a:solidFill>
+                  </a:tcPr>
+                </a:tc>
+              </a:tr>
+              <a:tr h="638640">
+                <a:tc>
+                  <a:txBody>
+                    <a:bodyPr lIns="90000" rIns="90000" tIns="46800" bIns="46800"/>
+                    <a:p>
+                      <a:pPr algn="ctr"/>
+                      <a:r>
+                        <a:rPr b="1" lang="es-NI" sz="1800" spc="-1" strike="noStrike">
+                          <a:latin typeface="Arial"/>
+                        </a:rPr>
+                        <a:t>3</a:t>
+                      </a:r>
+                      <a:endParaRPr b="0" lang="es-NI" sz="1800" spc="-1" strike="noStrike">
+                        <a:latin typeface="Arial"/>
+                      </a:endParaRPr>
+                    </a:p>
+                  </a:txBody>
+                  <a:tcPr marL="90000" marR="90000">
+                    <a:lnL w="720">
+                      <a:solidFill>
+                        <a:srgbClr val="ffffff"/>
+                      </a:solidFill>
+                    </a:lnL>
+                    <a:lnR w="720">
+                      <a:solidFill>
+                        <a:srgbClr val="ffffff"/>
+                      </a:solidFill>
+                    </a:lnR>
+                    <a:lnT w="720">
+                      <a:solidFill>
+                        <a:srgbClr val="ffffff"/>
+                      </a:solidFill>
+                    </a:lnT>
+                    <a:lnB w="720">
+                      <a:solidFill>
+                        <a:srgbClr val="ffffff"/>
+                      </a:solidFill>
+                    </a:lnB>
+                    <a:solidFill>
+                      <a:srgbClr val="e6e6e6"/>
+                    </a:solidFill>
+                  </a:tcPr>
+                </a:tc>
+                <a:tc>
+                  <a:txBody>
+                    <a:bodyPr lIns="90000" rIns="90000" tIns="46800" bIns="46800"/>
+                    <a:p>
+                      <a:r>
+                        <a:rPr b="0" lang="es-NI" sz="1800" spc="-1" strike="noStrike">
+                          <a:latin typeface="Arial"/>
+                        </a:rPr>
+                        <a:t>la libertad de mejorar el programa y hacer públicas esas mejoras a los demás, de modo que toda la comunidad se beneficie (mejora).</a:t>
+                      </a:r>
+                      <a:endParaRPr b="0" lang="es-NI" sz="1800" spc="-1" strike="noStrike">
+                        <a:latin typeface="Arial"/>
+                      </a:endParaRPr>
+                    </a:p>
+                    <a:p>
+                      <a:endParaRPr b="0" lang="es-NI" sz="1800" spc="-1" strike="noStrike">
+                        <a:latin typeface="Arial"/>
+                      </a:endParaRPr>
+                    </a:p>
+                  </a:txBody>
+                  <a:tcPr marL="90000" marR="90000">
+                    <a:lnL w="720">
+                      <a:solidFill>
+                        <a:srgbClr val="ffffff"/>
+                      </a:solidFill>
+                    </a:lnL>
+                    <a:lnR w="720">
+                      <a:solidFill>
+                        <a:srgbClr val="ffffff"/>
+                      </a:solidFill>
+                    </a:lnR>
+                    <a:lnT w="720">
+                      <a:solidFill>
+                        <a:srgbClr val="ffffff"/>
+                      </a:solidFill>
+                    </a:lnT>
+                    <a:lnB w="720">
+                      <a:solidFill>
+                        <a:srgbClr val="ffffff"/>
+                      </a:solidFill>
+                    </a:lnB>
+                    <a:solidFill>
+                      <a:srgbClr val="e6e6e6"/>
+                    </a:solidFill>
+                  </a:tcPr>
+                </a:tc>
+              </a:tr>
+              <a:tr h="614160">
+                <a:tc>
+                  <a:txBody>
+                    <a:bodyPr lIns="90000" rIns="90000" tIns="46800" bIns="46800"/>
+                    <a:p>
+                      <a:pPr algn="ctr"/>
+                      <a:r>
+                        <a:rPr b="1" lang="es-NI" sz="1800" spc="-1" strike="noStrike">
+                          <a:latin typeface="Arial"/>
+                        </a:rPr>
+                        <a:t>1 Y 3</a:t>
+                      </a:r>
+                      <a:endParaRPr b="0" lang="es-NI" sz="1800" spc="-1" strike="noStrike">
+                        <a:latin typeface="Arial"/>
+                      </a:endParaRPr>
+                    </a:p>
+                  </a:txBody>
+                  <a:tcPr marL="90000" marR="90000">
+                    <a:lnL w="720">
+                      <a:solidFill>
+                        <a:srgbClr val="ffffff"/>
+                      </a:solidFill>
+                    </a:lnL>
+                    <a:lnR w="720">
+                      <a:solidFill>
+                        <a:srgbClr val="ffffff"/>
+                      </a:solidFill>
+                    </a:lnR>
+                    <a:lnT w="720">
+                      <a:solidFill>
+                        <a:srgbClr val="ffffff"/>
+                      </a:solidFill>
+                    </a:lnT>
+                    <a:lnB w="720">
+                      <a:solidFill>
+                        <a:srgbClr val="ffffff"/>
+                      </a:solidFill>
+                    </a:lnB>
+                    <a:solidFill>
+                      <a:srgbClr val="cccccc"/>
+                    </a:solidFill>
+                  </a:tcPr>
+                </a:tc>
+                <a:tc>
+                  <a:txBody>
+                    <a:bodyPr lIns="90000" rIns="90000" tIns="46800" bIns="46800"/>
+                    <a:p>
+                      <a:r>
+                        <a:rPr b="0" lang="es-NI" sz="1800" spc="-1" strike="noStrike">
+                          <a:latin typeface="Arial"/>
+                        </a:rPr>
+                        <a:t>requieren acceso al código fuente porque estudiar y modificar software sin su código fuente es muy poco viable.</a:t>
+                      </a:r>
+                      <a:endParaRPr b="0" lang="es-NI" sz="1800" spc="-1" strike="noStrike">
+                        <a:latin typeface="Arial"/>
+                      </a:endParaRPr>
+                    </a:p>
+                  </a:txBody>
+                  <a:tcPr marL="90000" marR="90000">
+                    <a:lnL w="720">
+                      <a:solidFill>
+                        <a:srgbClr val="ffffff"/>
+                      </a:solidFill>
+                    </a:lnL>
+                    <a:lnR w="720">
+                      <a:solidFill>
+                        <a:srgbClr val="ffffff"/>
+                      </a:solidFill>
+                    </a:lnR>
+                    <a:lnT w="720">
+                      <a:solidFill>
+                        <a:srgbClr val="ffffff"/>
+                      </a:solidFill>
+                    </a:lnT>
+                    <a:lnB w="720">
+                      <a:solidFill>
+                        <a:srgbClr val="ffffff"/>
+                      </a:solidFill>
+                    </a:lnB>
+                    <a:solidFill>
+                      <a:srgbClr val="cccccc"/>
+                    </a:solidFill>
+                  </a:tcPr>
+                </a:tc>
+              </a:tr>
+            </a:tbl>
+          </a:graphicData>
+        </a:graphic>
+      </p:graphicFrame>
     </p:spTree>
   </p:cSld>
   <p:timing>
@@ -7478,7 +7948,7 @@
                 </a:solidFill>
                 <a:latin typeface="Source Sans Pro Black"/>
               </a:rPr>
-              <a:t>Aceptación de usuarios</a:t>
+              <a:t>¿Por qué usar software libre?</a:t>
             </a:r>
             <a:endParaRPr b="1" lang="es-NI" sz="3200" spc="-1" strike="noStrike">
               <a:solidFill>
@@ -7489,19 +7959,219 @@
           </a:p>
         </p:txBody>
       </p:sp>
+      <p:sp>
+        <p:nvSpPr>
+          <p:cNvPr id="105" name="TextShape 2"/>
+          <p:cNvSpPr txBox="1"/>
+          <p:nvPr/>
+        </p:nvSpPr>
+        <p:spPr>
+          <a:xfrm>
+            <a:off x="360000" y="1980000"/>
+            <a:ext cx="9180000" cy="4680000"/>
+          </a:xfrm>
+          <a:prstGeom prst="rect">
+            <a:avLst/>
+          </a:prstGeom>
+          <a:noFill/>
+          <a:ln>
+            <a:noFill/>
+          </a:ln>
+        </p:spPr>
+        <p:txBody>
+          <a:bodyPr lIns="0" rIns="0" tIns="0" bIns="0">
+            <a:normAutofit/>
+          </a:bodyPr>
+          <a:p>
+            <a:pPr marL="216000" indent="-216000">
+              <a:spcAft>
+                <a:spcPts val="1142"/>
+              </a:spcAft>
+              <a:buBlip>
+                <a:blip r:embed="rId1"/>
+              </a:buBlip>
+            </a:pPr>
+            <a:r>
+              <a:rPr b="1" lang="es-NI" sz="2600" spc="-1" strike="noStrike">
+                <a:solidFill>
+                  <a:srgbClr val="1c1c1c"/>
+                </a:solidFill>
+                <a:latin typeface="Source Sans Pro Semibold"/>
+              </a:rPr>
+              <a:t>Puede ser compartido con otro usuarios.</a:t>
+            </a:r>
+            <a:endParaRPr b="1" lang="es-NI" sz="2600" spc="-1" strike="noStrike">
+              <a:solidFill>
+                <a:srgbClr val="1c1c1c"/>
+              </a:solidFill>
+              <a:latin typeface="Source Sans Pro Semibold"/>
+            </a:endParaRPr>
+          </a:p>
+          <a:p>
+            <a:pPr marL="216000" indent="-216000">
+              <a:spcAft>
+                <a:spcPts val="1142"/>
+              </a:spcAft>
+              <a:buBlip>
+                <a:blip r:embed="rId2"/>
+              </a:buBlip>
+            </a:pPr>
+            <a:r>
+              <a:rPr b="1" lang="es-NI" sz="2600" spc="-1" strike="noStrike">
+                <a:solidFill>
+                  <a:srgbClr val="1c1c1c"/>
+                </a:solidFill>
+                <a:latin typeface="Source Sans Pro Semibold"/>
+              </a:rPr>
+              <a:t>El usuario no depende del creador del software.</a:t>
+            </a:r>
+            <a:endParaRPr b="1" lang="es-NI" sz="2600" spc="-1" strike="noStrike">
+              <a:solidFill>
+                <a:srgbClr val="1c1c1c"/>
+              </a:solidFill>
+              <a:latin typeface="Source Sans Pro Semibold"/>
+            </a:endParaRPr>
+          </a:p>
+          <a:p>
+            <a:pPr marL="216000" indent="-216000">
+              <a:spcAft>
+                <a:spcPts val="1142"/>
+              </a:spcAft>
+              <a:buBlip>
+                <a:blip r:embed="rId3"/>
+              </a:buBlip>
+            </a:pPr>
+            <a:r>
+              <a:rPr b="1" lang="es-NI" sz="2600" spc="-1" strike="noStrike">
+                <a:solidFill>
+                  <a:srgbClr val="1c1c1c"/>
+                </a:solidFill>
+                <a:latin typeface="Source Sans Pro Semibold"/>
+              </a:rPr>
+              <a:t>No infringe ninguna ley al utilizarlo o distribuirlo.</a:t>
+            </a:r>
+            <a:endParaRPr b="1" lang="es-NI" sz="2600" spc="-1" strike="noStrike">
+              <a:solidFill>
+                <a:srgbClr val="1c1c1c"/>
+              </a:solidFill>
+              <a:latin typeface="Source Sans Pro Semibold"/>
+            </a:endParaRPr>
+          </a:p>
+          <a:p>
+            <a:pPr marL="216000" indent="-216000">
+              <a:spcAft>
+                <a:spcPts val="1142"/>
+              </a:spcAft>
+              <a:buBlip>
+                <a:blip r:embed="rId4"/>
+              </a:buBlip>
+            </a:pPr>
+            <a:r>
+              <a:rPr b="1" lang="es-NI" sz="2600" spc="-1" strike="noStrike">
+                <a:solidFill>
+                  <a:srgbClr val="1c1c1c"/>
+                </a:solidFill>
+                <a:latin typeface="Source Sans Pro Semibold"/>
+              </a:rPr>
+              <a:t>Elijes los programa que Quieres usar sin condicionamiento del Desarrollador.</a:t>
+            </a:r>
+            <a:endParaRPr b="1" lang="es-NI" sz="2600" spc="-1" strike="noStrike">
+              <a:solidFill>
+                <a:srgbClr val="1c1c1c"/>
+              </a:solidFill>
+              <a:latin typeface="Source Sans Pro Semibold"/>
+            </a:endParaRPr>
+          </a:p>
+          <a:p>
+            <a:pPr marL="216000" indent="-216000">
+              <a:spcAft>
+                <a:spcPts val="1142"/>
+              </a:spcAft>
+              <a:buBlip>
+                <a:blip r:embed="rId5"/>
+              </a:buBlip>
+            </a:pPr>
+            <a:r>
+              <a:rPr b="1" lang="es-NI" sz="2600" spc="-1" strike="noStrike">
+                <a:solidFill>
+                  <a:srgbClr val="1c1c1c"/>
+                </a:solidFill>
+                <a:latin typeface="Source Sans Pro Semibold"/>
+              </a:rPr>
+              <a:t>No contiene código malicioso o que invada tu privacidad.</a:t>
+            </a:r>
+            <a:endParaRPr b="1" lang="es-NI" sz="2600" spc="-1" strike="noStrike">
+              <a:solidFill>
+                <a:srgbClr val="1c1c1c"/>
+              </a:solidFill>
+              <a:latin typeface="Source Sans Pro Semibold"/>
+            </a:endParaRPr>
+          </a:p>
+          <a:p>
+            <a:pPr marL="216000" indent="-216000">
+              <a:spcAft>
+                <a:spcPts val="1142"/>
+              </a:spcAft>
+              <a:buBlip>
+                <a:blip r:embed="rId6"/>
+              </a:buBlip>
+            </a:pPr>
+            <a:r>
+              <a:rPr b="1" lang="es-NI" sz="2600" spc="-1" strike="noStrike">
+                <a:solidFill>
+                  <a:srgbClr val="1c1c1c"/>
+                </a:solidFill>
+                <a:latin typeface="Source Sans Pro Semibold"/>
+              </a:rPr>
+              <a:t>Con los archivos fuentes de los programas puede aprender a programar.</a:t>
+            </a:r>
+            <a:endParaRPr b="1" lang="es-NI" sz="2600" spc="-1" strike="noStrike">
+              <a:solidFill>
+                <a:srgbClr val="1c1c1c"/>
+              </a:solidFill>
+              <a:latin typeface="Source Sans Pro Semibold"/>
+            </a:endParaRPr>
+          </a:p>
+          <a:p>
+            <a:pPr marL="216000" indent="-216000">
+              <a:spcAft>
+                <a:spcPts val="1142"/>
+              </a:spcAft>
+              <a:buBlip>
+                <a:blip r:embed="rId7"/>
+              </a:buBlip>
+            </a:pPr>
+            <a:r>
+              <a:rPr b="1" lang="es-NI" sz="2600" spc="-1" strike="noStrike">
+                <a:solidFill>
+                  <a:srgbClr val="1c1c1c"/>
+                </a:solidFill>
+                <a:latin typeface="Source Sans Pro Semibold"/>
+              </a:rPr>
+              <a:t>Sin números de aplicaciones para la educación, entretenimiento,Desarrollo,Ingeniera y ciencias.</a:t>
+            </a:r>
+            <a:endParaRPr b="1" lang="es-NI" sz="2600" spc="-1" strike="noStrike">
+              <a:solidFill>
+                <a:srgbClr val="1c1c1c"/>
+              </a:solidFill>
+              <a:latin typeface="Source Sans Pro Semibold"/>
+            </a:endParaRPr>
+          </a:p>
+        </p:txBody>
+      </p:sp>
       <p:pic>
         <p:nvPicPr>
-          <p:cNvPr id="105" name="" descr=""/>
+          <p:cNvPr id="106" name="" descr=""/>
           <p:cNvPicPr/>
           <p:nvPr/>
         </p:nvPicPr>
         <p:blipFill>
-          <a:blip r:embed="rId1"/>
+          <a:blip r:embed="rId8"/>
           <a:stretch/>
         </p:blipFill>
         <p:spPr>
           <a:xfrm>
-            <a:off x="8816760" y="309600"/>
+            <a:off x="8816760" y="309240"/>
             <a:ext cx="817200" cy="951480"/>
           </a:xfrm>
           <a:prstGeom prst="rect">
@@ -7563,7 +8233,7 @@
       </p:grpSpPr>
       <p:sp>
         <p:nvSpPr>
-          <p:cNvPr id="106" name="TextShape 1"/>
+          <p:cNvPr id="107" name="TextShape 1"/>
           <p:cNvSpPr txBox="1"/>
           <p:nvPr/>
         </p:nvSpPr>
@@ -7590,176 +8260,13 @@
                 </a:solidFill>
                 <a:latin typeface="Source Sans Pro Black"/>
               </a:rPr>
-              <a:t>Distribuciones Gnu/Linux</a:t>
+              <a:t>Aceptación de usuarios</a:t>
             </a:r>
             <a:endParaRPr b="1" lang="es-NI" sz="3200" spc="-1" strike="noStrike">
               <a:solidFill>
                 <a:srgbClr val="ffffff"/>
               </a:solidFill>
               <a:latin typeface="Source Sans Pro Black"/>
-            </a:endParaRPr>
-          </a:p>
-        </p:txBody>
-      </p:sp>
-      <p:sp>
-        <p:nvSpPr>
-          <p:cNvPr id="107" name="TextShape 2"/>
-          <p:cNvSpPr txBox="1"/>
-          <p:nvPr/>
-        </p:nvSpPr>
-        <p:spPr>
-          <a:xfrm>
-            <a:off x="360000" y="1980000"/>
-            <a:ext cx="9180000" cy="4680000"/>
-          </a:xfrm>
-          <a:prstGeom prst="rect">
-            <a:avLst/>
-          </a:prstGeom>
-          <a:noFill/>
-          <a:ln>
-            <a:noFill/>
-          </a:ln>
-        </p:spPr>
-        <p:txBody>
-          <a:bodyPr lIns="0" rIns="0" tIns="0" bIns="0">
-            <a:normAutofit/>
-          </a:bodyPr>
-          <a:p>
-            <a:pPr marL="360000" indent="-324000">
-              <a:spcAft>
-                <a:spcPts val="1142"/>
-              </a:spcAft>
-              <a:buBlip>
-                <a:blip r:embed="rId1"/>
-              </a:buBlip>
-            </a:pPr>
-            <a:r>
-              <a:rPr b="1" lang="es-NI" sz="2600" spc="-1" strike="noStrike">
-                <a:solidFill>
-                  <a:srgbClr val="1c1c1c"/>
-                </a:solidFill>
-                <a:latin typeface="Source Sans Pro Semibold"/>
-              </a:rPr>
-              <a:t>¿Que es una Distribucion Gnu/Linux? </a:t>
-            </a:r>
-            <a:endParaRPr b="1" lang="es-NI" sz="2600" spc="-1" strike="noStrike">
-              <a:solidFill>
-                <a:srgbClr val="1c1c1c"/>
-              </a:solidFill>
-              <a:latin typeface="Source Sans Pro Semibold"/>
-            </a:endParaRPr>
-          </a:p>
-          <a:p>
-            <a:pPr marL="360000">
-              <a:spcAft>
-                <a:spcPts val="1142"/>
-              </a:spcAft>
-            </a:pPr>
-            <a:r>
-              <a:rPr b="1" lang="es-NI" sz="2600" spc="-1" strike="noStrike">
-                <a:solidFill>
-                  <a:srgbClr val="1c1c1c"/>
-                </a:solidFill>
-                <a:latin typeface="Source Sans Pro Semibold"/>
-              </a:rPr>
-              <a:t>Una distribución Gnu/Linux es una distribución de software libre basada en el núcleo Linux que incluye determinados paquetes de software de Gnu y otros software para satisfacer las necesidades de un grupo específico de usuarios. Por lo general están compuestas, total o mayoritariamente, de software libre, aunque a menudo incorporan aplicaciones o controladores propietarios. </a:t>
-            </a:r>
-            <a:endParaRPr b="1" lang="es-NI" sz="2600" spc="-1" strike="noStrike">
-              <a:solidFill>
-                <a:srgbClr val="1c1c1c"/>
-              </a:solidFill>
-              <a:latin typeface="Source Sans Pro Semibold"/>
-            </a:endParaRPr>
-          </a:p>
-          <a:p>
-            <a:pPr marL="360000" indent="-360000">
-              <a:spcAft>
-                <a:spcPts val="1142"/>
-              </a:spcAft>
-              <a:buBlip>
-                <a:blip r:embed="rId2"/>
-              </a:buBlip>
-            </a:pPr>
-            <a:r>
-              <a:rPr b="1" lang="es-NI" sz="2600" spc="-1" strike="noStrike">
-                <a:solidFill>
-                  <a:srgbClr val="1c1c1c"/>
-                </a:solidFill>
-                <a:latin typeface="Source Sans Pro Semibold"/>
-              </a:rPr>
-              <a:t>Componentes</a:t>
-            </a:r>
-            <a:endParaRPr b="1" lang="es-NI" sz="2600" spc="-1" strike="noStrike">
-              <a:solidFill>
-                <a:srgbClr val="1c1c1c"/>
-              </a:solidFill>
-              <a:latin typeface="Source Sans Pro Semibold"/>
-            </a:endParaRPr>
-          </a:p>
-          <a:p>
-            <a:pPr marL="360000">
-              <a:spcAft>
-                <a:spcPts val="1142"/>
-              </a:spcAft>
-            </a:pPr>
-            <a:r>
-              <a:rPr b="1" lang="es-NI" sz="2600" spc="-1" strike="noStrike">
-                <a:solidFill>
-                  <a:srgbClr val="1c1c1c"/>
-                </a:solidFill>
-                <a:latin typeface="Source Sans Pro Semibold"/>
-              </a:rPr>
-              <a:t>El conjunto típico de una distribución Gnu/Linux contiene un núcleo, herramientas y bibliotecas, software adicional, documentación, un sistema de ventanas, un administrador de ventanas, un entorno de escritorio, y un gestor de paquetes.</a:t>
-            </a:r>
-            <a:endParaRPr b="1" lang="es-NI" sz="2600" spc="-1" strike="noStrike">
-              <a:solidFill>
-                <a:srgbClr val="1c1c1c"/>
-              </a:solidFill>
-              <a:latin typeface="Source Sans Pro Semibold"/>
-            </a:endParaRPr>
-          </a:p>
-          <a:p>
-            <a:pPr>
-              <a:spcAft>
-                <a:spcPts val="1142"/>
-              </a:spcAft>
-            </a:pPr>
-            <a:r>
-              <a:rPr b="1" lang="es-NI" sz="2600" spc="-1" strike="noStrike">
-                <a:solidFill>
-                  <a:srgbClr val="1c1c1c"/>
-                </a:solidFill>
-                <a:latin typeface="Source Sans Pro Semibold"/>
-              </a:rPr>
-              <a:t> </a:t>
-            </a:r>
-            <a:endParaRPr b="1" lang="es-NI" sz="2600" spc="-1" strike="noStrike">
-              <a:solidFill>
-                <a:srgbClr val="1c1c1c"/>
-              </a:solidFill>
-              <a:latin typeface="Source Sans Pro Semibold"/>
-            </a:endParaRPr>
-          </a:p>
-          <a:p>
-            <a:pPr>
-              <a:spcAft>
-                <a:spcPts val="1142"/>
-              </a:spcAft>
-            </a:pPr>
-            <a:r>
-              <a:rPr b="1" lang="es-NI" sz="2600" spc="-1" strike="noStrike">
-                <a:solidFill>
-                  <a:srgbClr val="1c1c1c"/>
-                </a:solidFill>
-                <a:latin typeface="Source Sans Pro Semibold"/>
-              </a:rPr>
-              <a:t> </a:t>
-            </a:r>
-            <a:endParaRPr b="1" lang="es-NI" sz="2600" spc="-1" strike="noStrike">
-              <a:solidFill>
-                <a:srgbClr val="1c1c1c"/>
-              </a:solidFill>
-              <a:latin typeface="Source Sans Pro Semibold"/>
             </a:endParaRPr>
           </a:p>
         </p:txBody>
@@ -7771,12 +8278,12 @@
           <p:nvPr/>
         </p:nvPicPr>
         <p:blipFill>
-          <a:blip r:embed="rId3"/>
+          <a:blip r:embed="rId1"/>
           <a:stretch/>
         </p:blipFill>
         <p:spPr>
           <a:xfrm>
-            <a:off x="8816760" y="309960"/>
+            <a:off x="8816760" y="309600"/>
             <a:ext cx="817200" cy="951480"/>
           </a:xfrm>
           <a:prstGeom prst="rect">
@@ -7865,7 +8372,7 @@
                 </a:solidFill>
                 <a:latin typeface="Source Sans Pro Black"/>
               </a:rPr>
-              <a:t>Mitos sobre Gnu/Linux</a:t>
+              <a:t>Distribuciones GNU/Linux</a:t>
             </a:r>
             <a:endParaRPr b="1" lang="es-NI" sz="3200" spc="-1" strike="noStrike">
               <a:solidFill>
@@ -7900,219 +8407,141 @@
             <a:normAutofit/>
           </a:bodyPr>
           <a:p>
-            <a:pPr lvl="1" marL="288000">
+            <a:pPr marL="360000" indent="-324000">
               <a:spcAft>
-                <a:spcPts val="1134"/>
+                <a:spcPts val="1142"/>
               </a:spcAft>
-              <a:buClr>
-                <a:srgbClr val="000000"/>
-              </a:buClr>
-              <a:buFont typeface="StarSymbol"/>
-              <a:buAutoNum type="arabicPeriod"/>
+              <a:buBlip>
+                <a:blip r:embed="rId1"/>
+              </a:buBlip>
             </a:pPr>
             <a:r>
-              <a:rPr b="0" lang="es-NI" sz="2200" spc="-1" strike="noStrike">
+              <a:rPr b="1" lang="es-NI" sz="2600" spc="-1" strike="noStrike">
                 <a:solidFill>
                   <a:srgbClr val="1c1c1c"/>
                 </a:solidFill>
-                <a:latin typeface="Source Sans Pro Light"/>
+                <a:latin typeface="Source Sans Pro Semibold"/>
               </a:rPr>
-              <a:t>Linux es difícil y es para expertos.</a:t>
+              <a:t>¿Que es una Distribucion Gnu/Linux? </a:t>
             </a:r>
-            <a:endParaRPr b="0" lang="es-NI" sz="2200" spc="-1" strike="noStrike">
-              <a:solidFill>
-                <a:srgbClr val="1c1c1c"/>
-              </a:solidFill>
-              <a:latin typeface="Source Sans Pro Light"/>
-            </a:endParaRPr>
-          </a:p>
-          <a:p>
-            <a:pPr lvl="1" marL="288000">
+            <a:endParaRPr b="1" lang="es-NI" sz="2600" spc="-1" strike="noStrike">
+              <a:solidFill>
+                <a:srgbClr val="1c1c1c"/>
+              </a:solidFill>
+              <a:latin typeface="Source Sans Pro Semibold"/>
+            </a:endParaRPr>
+          </a:p>
+          <a:p>
+            <a:pPr marL="360000">
               <a:spcAft>
-                <a:spcPts val="1134"/>
+                <a:spcPts val="1142"/>
               </a:spcAft>
-              <a:buClr>
-                <a:srgbClr val="000000"/>
-              </a:buClr>
-              <a:buFont typeface="StarSymbol"/>
-              <a:buAutoNum type="arabicPeriod"/>
             </a:pPr>
             <a:r>
-              <a:rPr b="0" lang="es-NI" sz="2200" spc="-1" strike="noStrike">
+              <a:rPr b="1" lang="es-NI" sz="2600" spc="-1" strike="noStrike">
                 <a:solidFill>
                   <a:srgbClr val="1c1c1c"/>
                 </a:solidFill>
-                <a:latin typeface="Source Sans Pro Light"/>
+                <a:latin typeface="Source Sans Pro Semibold"/>
               </a:rPr>
-              <a:t>Linux es para gente pobre.</a:t>
+              <a:t>Una distribución Gnu/Linux es una distribución de software libre basada en el núcleo Linux que incluye determinados paquetes de software de Gnu y otros software para satisfacer las necesidades de un grupo específico de usuarios. Por lo general están compuestas, total o mayoritariamente, de software libre, aunque a menudo incorporan aplicaciones o controladores propietarios. </a:t>
             </a:r>
-            <a:endParaRPr b="0" lang="es-NI" sz="2200" spc="-1" strike="noStrike">
-              <a:solidFill>
-                <a:srgbClr val="1c1c1c"/>
-              </a:solidFill>
-              <a:latin typeface="Source Sans Pro Light"/>
-            </a:endParaRPr>
-          </a:p>
-          <a:p>
-            <a:pPr lvl="1" marL="288000">
+            <a:endParaRPr b="1" lang="es-NI" sz="2600" spc="-1" strike="noStrike">
+              <a:solidFill>
+                <a:srgbClr val="1c1c1c"/>
+              </a:solidFill>
+              <a:latin typeface="Source Sans Pro Semibold"/>
+            </a:endParaRPr>
+          </a:p>
+          <a:p>
+            <a:pPr marL="360000" indent="-360000">
               <a:spcAft>
-                <a:spcPts val="1134"/>
+                <a:spcPts val="1142"/>
               </a:spcAft>
-              <a:buClr>
-                <a:srgbClr val="000000"/>
-              </a:buClr>
-              <a:buFont typeface="StarSymbol"/>
-              <a:buAutoNum type="arabicPeriod"/>
+              <a:buBlip>
+                <a:blip r:embed="rId2"/>
+              </a:buBlip>
             </a:pPr>
             <a:r>
-              <a:rPr b="0" lang="es-NI" sz="2200" spc="-1" strike="noStrike">
+              <a:rPr b="1" lang="es-NI" sz="2600" spc="-1" strike="noStrike">
                 <a:solidFill>
                   <a:srgbClr val="1c1c1c"/>
                 </a:solidFill>
-                <a:latin typeface="Source Sans Pro Light"/>
+                <a:latin typeface="Source Sans Pro Semibold"/>
               </a:rPr>
-              <a:t>Linux es para delincuentes.</a:t>
+              <a:t>Componentes</a:t>
             </a:r>
-            <a:endParaRPr b="0" lang="es-NI" sz="2200" spc="-1" strike="noStrike">
-              <a:solidFill>
-                <a:srgbClr val="1c1c1c"/>
-              </a:solidFill>
-              <a:latin typeface="Source Sans Pro Light"/>
-            </a:endParaRPr>
-          </a:p>
-          <a:p>
-            <a:pPr lvl="1" marL="288000">
+            <a:endParaRPr b="1" lang="es-NI" sz="2600" spc="-1" strike="noStrike">
+              <a:solidFill>
+                <a:srgbClr val="1c1c1c"/>
+              </a:solidFill>
+              <a:latin typeface="Source Sans Pro Semibold"/>
+            </a:endParaRPr>
+          </a:p>
+          <a:p>
+            <a:pPr marL="360000">
               <a:spcAft>
-                <a:spcPts val="1134"/>
+                <a:spcPts val="1142"/>
               </a:spcAft>
-              <a:buClr>
-                <a:srgbClr val="000000"/>
-              </a:buClr>
-              <a:buFont typeface="StarSymbol"/>
-              <a:buAutoNum type="arabicPeriod"/>
             </a:pPr>
             <a:r>
-              <a:rPr b="0" lang="es-NI" sz="2200" spc="-1" strike="noStrike">
+              <a:rPr b="1" lang="es-NI" sz="2600" spc="-1" strike="noStrike">
                 <a:solidFill>
                   <a:srgbClr val="1c1c1c"/>
                 </a:solidFill>
-                <a:latin typeface="Source Sans Pro Light"/>
+                <a:latin typeface="Source Sans Pro Semibold"/>
               </a:rPr>
-              <a:t>El software libre es cosa de comunistas o gente de izquierda.</a:t>
+              <a:t>El conjunto típico de una distribución Gnu/Linux contiene un núcleo, herramientas y bibliotecas, software adicional, documentación, un sistema de ventanas, un administrador de ventanas, un entorno de escritorio, y un gestor de paquetes.</a:t>
             </a:r>
-            <a:endParaRPr b="0" lang="es-NI" sz="2200" spc="-1" strike="noStrike">
-              <a:solidFill>
-                <a:srgbClr val="1c1c1c"/>
-              </a:solidFill>
-              <a:latin typeface="Source Sans Pro Light"/>
-            </a:endParaRPr>
-          </a:p>
-          <a:p>
-            <a:pPr lvl="1" marL="288000">
+            <a:endParaRPr b="1" lang="es-NI" sz="2600" spc="-1" strike="noStrike">
+              <a:solidFill>
+                <a:srgbClr val="1c1c1c"/>
+              </a:solidFill>
+              <a:latin typeface="Source Sans Pro Semibold"/>
+            </a:endParaRPr>
+          </a:p>
+          <a:p>
+            <a:pPr>
               <a:spcAft>
-                <a:spcPts val="1134"/>
+                <a:spcPts val="1142"/>
               </a:spcAft>
-              <a:buClr>
-                <a:srgbClr val="000000"/>
-              </a:buClr>
-              <a:buFont typeface="StarSymbol"/>
-              <a:buAutoNum type="arabicPeriod"/>
             </a:pPr>
             <a:r>
-              <a:rPr b="0" lang="es-NI" sz="2200" spc="-1" strike="noStrike">
+              <a:rPr b="1" lang="es-NI" sz="2600" spc="-1" strike="noStrike">
                 <a:solidFill>
                   <a:srgbClr val="1c1c1c"/>
                 </a:solidFill>
-                <a:latin typeface="Source Sans Pro Light"/>
+                <a:latin typeface="Source Sans Pro Semibold"/>
               </a:rPr>
-              <a:t>Linux no tiene soporte (atención al cliente).</a:t>
+              <a:t> </a:t>
             </a:r>
-            <a:endParaRPr b="0" lang="es-NI" sz="2200" spc="-1" strike="noStrike">
-              <a:solidFill>
-                <a:srgbClr val="1c1c1c"/>
-              </a:solidFill>
-              <a:latin typeface="Source Sans Pro Light"/>
-            </a:endParaRPr>
-          </a:p>
-          <a:p>
-            <a:pPr lvl="1" marL="288000">
+            <a:endParaRPr b="1" lang="es-NI" sz="2600" spc="-1" strike="noStrike">
+              <a:solidFill>
+                <a:srgbClr val="1c1c1c"/>
+              </a:solidFill>
+              <a:latin typeface="Source Sans Pro Semibold"/>
+            </a:endParaRPr>
+          </a:p>
+          <a:p>
+            <a:pPr>
               <a:spcAft>
-                <a:spcPts val="1134"/>
+                <a:spcPts val="1142"/>
               </a:spcAft>
-              <a:buClr>
-                <a:srgbClr val="000000"/>
-              </a:buClr>
-              <a:buFont typeface="StarSymbol"/>
-              <a:buAutoNum type="arabicPeriod"/>
             </a:pPr>
             <a:r>
-              <a:rPr b="0" lang="es-NI" sz="2200" spc="-1" strike="noStrike">
+              <a:rPr b="1" lang="es-NI" sz="2600" spc="-1" strike="noStrike">
                 <a:solidFill>
                   <a:srgbClr val="1c1c1c"/>
                 </a:solidFill>
-                <a:latin typeface="Source Sans Pro Light"/>
+                <a:latin typeface="Source Sans Pro Semibold"/>
               </a:rPr>
-              <a:t>Linux es inestable y poco fiable.</a:t>
+              <a:t> </a:t>
             </a:r>
-            <a:endParaRPr b="0" lang="es-NI" sz="2200" spc="-1" strike="noStrike">
-              <a:solidFill>
-                <a:srgbClr val="1c1c1c"/>
-              </a:solidFill>
-              <a:latin typeface="Source Sans Pro Light"/>
-            </a:endParaRPr>
-          </a:p>
-          <a:p>
-            <a:pPr lvl="1" marL="288000">
-              <a:spcAft>
-                <a:spcPts val="1134"/>
-              </a:spcAft>
-              <a:buClr>
-                <a:srgbClr val="000000"/>
-              </a:buClr>
-              <a:buFont typeface="StarSymbol"/>
-              <a:buAutoNum type="arabicPeriod"/>
-            </a:pPr>
-            <a:r>
-              <a:rPr b="0" lang="es-NI" sz="2200" spc="-1" strike="noStrike">
-                <a:solidFill>
-                  <a:srgbClr val="1c1c1c"/>
-                </a:solidFill>
-                <a:latin typeface="Source Sans Pro Light"/>
-              </a:rPr>
-              <a:t>No hay juegos en Linux.</a:t>
-            </a:r>
-            <a:endParaRPr b="0" lang="es-NI" sz="2200" spc="-1" strike="noStrike">
-              <a:solidFill>
-                <a:srgbClr val="1c1c1c"/>
-              </a:solidFill>
-              <a:latin typeface="Source Sans Pro Light"/>
-            </a:endParaRPr>
-          </a:p>
-          <a:p>
-            <a:pPr lvl="1" marL="288000">
-              <a:spcAft>
-                <a:spcPts val="1134"/>
-              </a:spcAft>
-              <a:buClr>
-                <a:srgbClr val="000000"/>
-              </a:buClr>
-              <a:buFont typeface="StarSymbol"/>
-              <a:buAutoNum type="arabicPeriod"/>
-            </a:pPr>
-            <a:r>
-              <a:rPr b="0" lang="es-NI" sz="2200" spc="-1" strike="noStrike">
-                <a:solidFill>
-                  <a:srgbClr val="1c1c1c"/>
-                </a:solidFill>
-                <a:latin typeface="Source Sans Pro Light"/>
-              </a:rPr>
-              <a:t>En linux no hay virus.</a:t>
-            </a:r>
-            <a:endParaRPr b="0" lang="es-NI" sz="2200" spc="-1" strike="noStrike">
-              <a:solidFill>
-                <a:srgbClr val="1c1c1c"/>
-              </a:solidFill>
-              <a:latin typeface="Source Sans Pro Light"/>
+            <a:endParaRPr b="1" lang="es-NI" sz="2600" spc="-1" strike="noStrike">
+              <a:solidFill>
+                <a:srgbClr val="1c1c1c"/>
+              </a:solidFill>
+              <a:latin typeface="Source Sans Pro Semibold"/>
             </a:endParaRPr>
           </a:p>
         </p:txBody>
@@ -8124,12 +8553,12 @@
           <p:nvPr/>
         </p:nvPicPr>
         <p:blipFill>
-          <a:blip r:embed="rId1"/>
+          <a:blip r:embed="rId3"/>
           <a:stretch/>
         </p:blipFill>
         <p:spPr>
           <a:xfrm>
-            <a:off x="8816760" y="310320"/>
+            <a:off x="8816760" y="309960"/>
             <a:ext cx="817200" cy="951480"/>
           </a:xfrm>
           <a:prstGeom prst="rect">
@@ -8218,7 +8647,7 @@
                 </a:solidFill>
                 <a:latin typeface="Source Sans Pro Black"/>
               </a:rPr>
-              <a:t>Distribuciones Mas populares</a:t>
+              <a:t>Mitos sobre GNU/Linux</a:t>
             </a:r>
             <a:endParaRPr b="1" lang="es-NI" sz="3200" spc="-1" strike="noStrike">
               <a:solidFill>
@@ -8253,267 +8682,219 @@
             <a:normAutofit/>
           </a:bodyPr>
           <a:p>
-            <a:pPr>
+            <a:pPr lvl="1" marL="288000">
               <a:spcAft>
-                <a:spcPts val="1142"/>
+                <a:spcPts val="1134"/>
               </a:spcAft>
+              <a:buClr>
+                <a:srgbClr val="000000"/>
+              </a:buClr>
+              <a:buFont typeface="StarSymbol"/>
+              <a:buAutoNum type="arabicPeriod"/>
             </a:pPr>
             <a:r>
-              <a:rPr b="1" lang="es-NI" sz="2600" spc="-1" strike="noStrike">
+              <a:rPr b="0" lang="es-NI" sz="2200" spc="-1" strike="noStrike">
                 <a:solidFill>
                   <a:srgbClr val="1c1c1c"/>
                 </a:solidFill>
-                <a:latin typeface="Source Sans Pro Semibold"/>
+                <a:latin typeface="Source Sans Pro Light"/>
               </a:rPr>
-              <a:t>Mint </a:t>
+              <a:t>Linux es difícil y es para expertos.</a:t>
             </a:r>
-            <a:endParaRPr b="1" lang="es-NI" sz="2600" spc="-1" strike="noStrike">
-              <a:solidFill>
-                <a:srgbClr val="1c1c1c"/>
-              </a:solidFill>
-              <a:latin typeface="Source Sans Pro Semibold"/>
-            </a:endParaRPr>
-          </a:p>
-          <a:p>
-            <a:pPr>
+            <a:endParaRPr b="0" lang="es-NI" sz="2200" spc="-1" strike="noStrike">
+              <a:solidFill>
+                <a:srgbClr val="1c1c1c"/>
+              </a:solidFill>
+              <a:latin typeface="Source Sans Pro Light"/>
+            </a:endParaRPr>
+          </a:p>
+          <a:p>
+            <a:pPr lvl="1" marL="288000">
               <a:spcAft>
-                <a:spcPts val="1142"/>
+                <a:spcPts val="1134"/>
               </a:spcAft>
+              <a:buClr>
+                <a:srgbClr val="000000"/>
+              </a:buClr>
+              <a:buFont typeface="StarSymbol"/>
+              <a:buAutoNum type="arabicPeriod"/>
             </a:pPr>
             <a:r>
-              <a:rPr b="1" lang="es-NI" sz="2600" spc="-1" strike="noStrike">
+              <a:rPr b="0" lang="es-NI" sz="2200" spc="-1" strike="noStrike">
                 <a:solidFill>
                   <a:srgbClr val="1c1c1c"/>
                 </a:solidFill>
-                <a:latin typeface="Source Sans Pro Semibold"/>
+                <a:latin typeface="Source Sans Pro Light"/>
               </a:rPr>
-              <a:t>Debian </a:t>
+              <a:t>Linux es para gente pobre.</a:t>
             </a:r>
-            <a:endParaRPr b="1" lang="es-NI" sz="2600" spc="-1" strike="noStrike">
-              <a:solidFill>
-                <a:srgbClr val="1c1c1c"/>
-              </a:solidFill>
-              <a:latin typeface="Source Sans Pro Semibold"/>
-            </a:endParaRPr>
-          </a:p>
-          <a:p>
-            <a:pPr>
+            <a:endParaRPr b="0" lang="es-NI" sz="2200" spc="-1" strike="noStrike">
+              <a:solidFill>
+                <a:srgbClr val="1c1c1c"/>
+              </a:solidFill>
+              <a:latin typeface="Source Sans Pro Light"/>
+            </a:endParaRPr>
+          </a:p>
+          <a:p>
+            <a:pPr lvl="1" marL="288000">
               <a:spcAft>
-                <a:spcPts val="1142"/>
+                <a:spcPts val="1134"/>
               </a:spcAft>
+              <a:buClr>
+                <a:srgbClr val="000000"/>
+              </a:buClr>
+              <a:buFont typeface="StarSymbol"/>
+              <a:buAutoNum type="arabicPeriod"/>
             </a:pPr>
             <a:r>
-              <a:rPr b="1" lang="es-NI" sz="2600" spc="-1" strike="noStrike">
+              <a:rPr b="0" lang="es-NI" sz="2200" spc="-1" strike="noStrike">
                 <a:solidFill>
                   <a:srgbClr val="1c1c1c"/>
                 </a:solidFill>
-                <a:latin typeface="Source Sans Pro Semibold"/>
+                <a:latin typeface="Source Sans Pro Light"/>
               </a:rPr>
-              <a:t>Ubuntu </a:t>
+              <a:t>Linux es para delincuentes.</a:t>
             </a:r>
-            <a:endParaRPr b="1" lang="es-NI" sz="2600" spc="-1" strike="noStrike">
-              <a:solidFill>
-                <a:srgbClr val="1c1c1c"/>
-              </a:solidFill>
-              <a:latin typeface="Source Sans Pro Semibold"/>
-            </a:endParaRPr>
-          </a:p>
-          <a:p>
-            <a:pPr>
+            <a:endParaRPr b="0" lang="es-NI" sz="2200" spc="-1" strike="noStrike">
+              <a:solidFill>
+                <a:srgbClr val="1c1c1c"/>
+              </a:solidFill>
+              <a:latin typeface="Source Sans Pro Light"/>
+            </a:endParaRPr>
+          </a:p>
+          <a:p>
+            <a:pPr lvl="1" marL="288000">
               <a:spcAft>
-                <a:spcPts val="1142"/>
+                <a:spcPts val="1134"/>
               </a:spcAft>
+              <a:buClr>
+                <a:srgbClr val="000000"/>
+              </a:buClr>
+              <a:buFont typeface="StarSymbol"/>
+              <a:buAutoNum type="arabicPeriod"/>
             </a:pPr>
             <a:r>
-              <a:rPr b="1" lang="es-NI" sz="2600" spc="-1" strike="noStrike">
+              <a:rPr b="0" lang="es-NI" sz="2200" spc="-1" strike="noStrike">
                 <a:solidFill>
                   <a:srgbClr val="1c1c1c"/>
                 </a:solidFill>
-                <a:latin typeface="Source Sans Pro Semibold"/>
+                <a:latin typeface="Source Sans Pro Light"/>
               </a:rPr>
-              <a:t>openSUSE </a:t>
+              <a:t>El software libre es cosa de comunistas o gente de izquierda.</a:t>
             </a:r>
-            <a:endParaRPr b="1" lang="es-NI" sz="2600" spc="-1" strike="noStrike">
-              <a:solidFill>
-                <a:srgbClr val="1c1c1c"/>
-              </a:solidFill>
-              <a:latin typeface="Source Sans Pro Semibold"/>
-            </a:endParaRPr>
-          </a:p>
-          <a:p>
-            <a:pPr>
+            <a:endParaRPr b="0" lang="es-NI" sz="2200" spc="-1" strike="noStrike">
+              <a:solidFill>
+                <a:srgbClr val="1c1c1c"/>
+              </a:solidFill>
+              <a:latin typeface="Source Sans Pro Light"/>
+            </a:endParaRPr>
+          </a:p>
+          <a:p>
+            <a:pPr lvl="1" marL="288000">
               <a:spcAft>
-                <a:spcPts val="1142"/>
+                <a:spcPts val="1134"/>
               </a:spcAft>
+              <a:buClr>
+                <a:srgbClr val="000000"/>
+              </a:buClr>
+              <a:buFont typeface="StarSymbol"/>
+              <a:buAutoNum type="arabicPeriod"/>
             </a:pPr>
             <a:r>
-              <a:rPr b="1" lang="es-NI" sz="2600" spc="-1" strike="noStrike">
+              <a:rPr b="0" lang="es-NI" sz="2200" spc="-1" strike="noStrike">
                 <a:solidFill>
                   <a:srgbClr val="1c1c1c"/>
                 </a:solidFill>
-                <a:latin typeface="Source Sans Pro Semibold"/>
+                <a:latin typeface="Source Sans Pro Light"/>
               </a:rPr>
-              <a:t>Manjaro </a:t>
+              <a:t>Linux no tiene soporte (atención al cliente).</a:t>
             </a:r>
-            <a:endParaRPr b="1" lang="es-NI" sz="2600" spc="-1" strike="noStrike">
-              <a:solidFill>
-                <a:srgbClr val="1c1c1c"/>
-              </a:solidFill>
-              <a:latin typeface="Source Sans Pro Semibold"/>
-            </a:endParaRPr>
-          </a:p>
-          <a:p>
-            <a:pPr>
+            <a:endParaRPr b="0" lang="es-NI" sz="2200" spc="-1" strike="noStrike">
+              <a:solidFill>
+                <a:srgbClr val="1c1c1c"/>
+              </a:solidFill>
+              <a:latin typeface="Source Sans Pro Light"/>
+            </a:endParaRPr>
+          </a:p>
+          <a:p>
+            <a:pPr lvl="1" marL="288000">
               <a:spcAft>
-                <a:spcPts val="1142"/>
+                <a:spcPts val="1134"/>
               </a:spcAft>
+              <a:buClr>
+                <a:srgbClr val="000000"/>
+              </a:buClr>
+              <a:buFont typeface="StarSymbol"/>
+              <a:buAutoNum type="arabicPeriod"/>
             </a:pPr>
             <a:r>
-              <a:rPr b="1" lang="es-NI" sz="2600" spc="-1" strike="noStrike">
+              <a:rPr b="0" lang="es-NI" sz="2200" spc="-1" strike="noStrike">
                 <a:solidFill>
                   <a:srgbClr val="1c1c1c"/>
                 </a:solidFill>
-                <a:latin typeface="Source Sans Pro Semibold"/>
+                <a:latin typeface="Source Sans Pro Light"/>
               </a:rPr>
-              <a:t>Fedora </a:t>
+              <a:t>Linux es inestable y poco fiable.</a:t>
             </a:r>
-            <a:endParaRPr b="1" lang="es-NI" sz="2600" spc="-1" strike="noStrike">
-              <a:solidFill>
-                <a:srgbClr val="1c1c1c"/>
-              </a:solidFill>
-              <a:latin typeface="Source Sans Pro Semibold"/>
-            </a:endParaRPr>
-          </a:p>
-          <a:p>
-            <a:pPr>
+            <a:endParaRPr b="0" lang="es-NI" sz="2200" spc="-1" strike="noStrike">
+              <a:solidFill>
+                <a:srgbClr val="1c1c1c"/>
+              </a:solidFill>
+              <a:latin typeface="Source Sans Pro Light"/>
+            </a:endParaRPr>
+          </a:p>
+          <a:p>
+            <a:pPr lvl="1" marL="288000">
               <a:spcAft>
-                <a:spcPts val="1142"/>
+                <a:spcPts val="1134"/>
               </a:spcAft>
+              <a:buClr>
+                <a:srgbClr val="000000"/>
+              </a:buClr>
+              <a:buFont typeface="StarSymbol"/>
+              <a:buAutoNum type="arabicPeriod"/>
             </a:pPr>
             <a:r>
-              <a:rPr b="1" lang="es-NI" sz="2600" spc="-1" strike="noStrike">
+              <a:rPr b="0" lang="es-NI" sz="2200" spc="-1" strike="noStrike">
                 <a:solidFill>
                   <a:srgbClr val="1c1c1c"/>
                 </a:solidFill>
-                <a:latin typeface="Source Sans Pro Semibold"/>
+                <a:latin typeface="Source Sans Pro Light"/>
               </a:rPr>
-              <a:t>elementary </a:t>
+              <a:t>No hay juegos en Linux.</a:t>
             </a:r>
-            <a:endParaRPr b="1" lang="es-NI" sz="2600" spc="-1" strike="noStrike">
-              <a:solidFill>
-                <a:srgbClr val="1c1c1c"/>
-              </a:solidFill>
-              <a:latin typeface="Source Sans Pro Semibold"/>
-            </a:endParaRPr>
-          </a:p>
-          <a:p>
-            <a:pPr>
+            <a:endParaRPr b="0" lang="es-NI" sz="2200" spc="-1" strike="noStrike">
+              <a:solidFill>
+                <a:srgbClr val="1c1c1c"/>
+              </a:solidFill>
+              <a:latin typeface="Source Sans Pro Light"/>
+            </a:endParaRPr>
+          </a:p>
+          <a:p>
+            <a:pPr lvl="1" marL="288000">
               <a:spcAft>
-                <a:spcPts val="1142"/>
+                <a:spcPts val="1134"/>
               </a:spcAft>
+              <a:buClr>
+                <a:srgbClr val="000000"/>
+              </a:buClr>
+              <a:buFont typeface="StarSymbol"/>
+              <a:buAutoNum type="arabicPeriod"/>
             </a:pPr>
             <a:r>
-              <a:rPr b="1" lang="es-NI" sz="2600" spc="-1" strike="noStrike">
+              <a:rPr b="0" lang="es-NI" sz="2200" spc="-1" strike="noStrike">
                 <a:solidFill>
                   <a:srgbClr val="1c1c1c"/>
                 </a:solidFill>
-                <a:latin typeface="Source Sans Pro Semibold"/>
+                <a:latin typeface="Source Sans Pro Light"/>
               </a:rPr>
-              <a:t>Zorin </a:t>
+              <a:t>En linux no hay virus.</a:t>
             </a:r>
-            <a:endParaRPr b="1" lang="es-NI" sz="2600" spc="-1" strike="noStrike">
-              <a:solidFill>
-                <a:srgbClr val="1c1c1c"/>
-              </a:solidFill>
-              <a:latin typeface="Source Sans Pro Semibold"/>
-            </a:endParaRPr>
-          </a:p>
-          <a:p>
-            <a:pPr>
-              <a:spcAft>
-                <a:spcPts val="1142"/>
-              </a:spcAft>
-            </a:pPr>
-            <a:r>
-              <a:rPr b="1" lang="es-NI" sz="2600" spc="-1" strike="noStrike">
-                <a:solidFill>
-                  <a:srgbClr val="1c1c1c"/>
-                </a:solidFill>
-                <a:latin typeface="Source Sans Pro Semibold"/>
-              </a:rPr>
-              <a:t>CentOS </a:t>
-            </a:r>
-            <a:endParaRPr b="1" lang="es-NI" sz="2600" spc="-1" strike="noStrike">
-              <a:solidFill>
-                <a:srgbClr val="1c1c1c"/>
-              </a:solidFill>
-              <a:latin typeface="Source Sans Pro Semibold"/>
-            </a:endParaRPr>
-          </a:p>
-          <a:p>
-            <a:pPr>
-              <a:spcAft>
-                <a:spcPts val="1142"/>
-              </a:spcAft>
-            </a:pPr>
-            <a:r>
-              <a:rPr b="1" lang="es-NI" sz="2600" spc="-1" strike="noStrike">
-                <a:solidFill>
-                  <a:srgbClr val="1c1c1c"/>
-                </a:solidFill>
-                <a:latin typeface="Source Sans Pro Semibold"/>
-              </a:rPr>
-              <a:t>Arch </a:t>
-            </a:r>
-            <a:endParaRPr b="1" lang="es-NI" sz="2600" spc="-1" strike="noStrike">
-              <a:solidFill>
-                <a:srgbClr val="1c1c1c"/>
-              </a:solidFill>
-              <a:latin typeface="Source Sans Pro Semibold"/>
-            </a:endParaRPr>
-          </a:p>
-          <a:p>
-            <a:pPr>
-              <a:spcAft>
-                <a:spcPts val="1142"/>
-              </a:spcAft>
-            </a:pPr>
-            <a:r>
-              <a:rPr b="1" lang="es-NI" sz="2600" spc="-1" strike="noStrike">
-                <a:solidFill>
-                  <a:srgbClr val="1c1c1c"/>
-                </a:solidFill>
-                <a:latin typeface="Source Sans Pro Semibold"/>
-              </a:rPr>
-              <a:t> </a:t>
-            </a:r>
-            <a:endParaRPr b="1" lang="es-NI" sz="2600" spc="-1" strike="noStrike">
-              <a:solidFill>
-                <a:srgbClr val="1c1c1c"/>
-              </a:solidFill>
-              <a:latin typeface="Source Sans Pro Semibold"/>
-            </a:endParaRPr>
-          </a:p>
-          <a:p>
-            <a:pPr>
-              <a:spcAft>
-                <a:spcPts val="1142"/>
-              </a:spcAft>
-            </a:pPr>
-            <a:r>
-              <a:rPr b="1" lang="es-NI" sz="2600" spc="-1" strike="noStrike">
-                <a:solidFill>
-                  <a:srgbClr val="1c1c1c"/>
-                </a:solidFill>
-                <a:latin typeface="Source Sans Pro Semibold"/>
-              </a:rPr>
-              <a:t> </a:t>
-            </a:r>
-            <a:endParaRPr b="1" lang="es-NI" sz="2600" spc="-1" strike="noStrike">
-              <a:solidFill>
-                <a:srgbClr val="1c1c1c"/>
-              </a:solidFill>
-              <a:latin typeface="Source Sans Pro Semibold"/>
+            <a:endParaRPr b="0" lang="es-NI" sz="2200" spc="-1" strike="noStrike">
+              <a:solidFill>
+                <a:srgbClr val="1c1c1c"/>
+              </a:solidFill>
+              <a:latin typeface="Source Sans Pro Light"/>
             </a:endParaRPr>
           </a:p>
         </p:txBody>
@@ -8530,30 +8911,7 @@
         </p:blipFill>
         <p:spPr>
           <a:xfrm>
-            <a:off x="3174840" y="1639080"/>
-            <a:ext cx="6287760" cy="4715640"/>
-          </a:xfrm>
-          <a:prstGeom prst="rect">
-            <a:avLst/>
-          </a:prstGeom>
-          <a:ln>
-            <a:noFill/>
-          </a:ln>
-        </p:spPr>
-      </p:pic>
-      <p:pic>
-        <p:nvPicPr>
-          <p:cNvPr id="115" name="" descr=""/>
-          <p:cNvPicPr/>
-          <p:nvPr/>
-        </p:nvPicPr>
-        <p:blipFill>
-          <a:blip r:embed="rId2"/>
-          <a:stretch/>
-        </p:blipFill>
-        <p:spPr>
-          <a:xfrm>
-            <a:off x="8816760" y="286920"/>
+            <a:off x="8816760" y="310320"/>
             <a:ext cx="817200" cy="951480"/>
           </a:xfrm>
           <a:prstGeom prst="rect">

</xml_diff>